<commit_message>
Updated server model parameters, updated presentation
</commit_message>
<xml_diff>
--- a/presentation.pptx
+++ b/presentation.pptx
@@ -4,19 +4,27 @@
   <p:sldMasterIdLst>
     <p:sldMasterId id="2147483660" r:id="rId1"/>
   </p:sldMasterIdLst>
+  <p:notesMasterIdLst>
+    <p:notesMasterId r:id="rId19"/>
+  </p:notesMasterIdLst>
   <p:sldIdLst>
     <p:sldId id="256" r:id="rId2"/>
     <p:sldId id="257" r:id="rId3"/>
     <p:sldId id="258" r:id="rId4"/>
-    <p:sldId id="259" r:id="rId5"/>
-    <p:sldId id="260" r:id="rId6"/>
-    <p:sldId id="262" r:id="rId7"/>
-    <p:sldId id="261" r:id="rId8"/>
-    <p:sldId id="263" r:id="rId9"/>
-    <p:sldId id="264" r:id="rId10"/>
-    <p:sldId id="265" r:id="rId11"/>
-    <p:sldId id="266" r:id="rId12"/>
-    <p:sldId id="268" r:id="rId13"/>
+    <p:sldId id="269" r:id="rId5"/>
+    <p:sldId id="259" r:id="rId6"/>
+    <p:sldId id="260" r:id="rId7"/>
+    <p:sldId id="270" r:id="rId8"/>
+    <p:sldId id="271" r:id="rId9"/>
+    <p:sldId id="272" r:id="rId10"/>
+    <p:sldId id="262" r:id="rId11"/>
+    <p:sldId id="261" r:id="rId12"/>
+    <p:sldId id="263" r:id="rId13"/>
+    <p:sldId id="264" r:id="rId14"/>
+    <p:sldId id="265" r:id="rId15"/>
+    <p:sldId id="266" r:id="rId16"/>
+    <p:sldId id="268" r:id="rId17"/>
+    <p:sldId id="273" r:id="rId18"/>
   </p:sldIdLst>
   <p:sldSz cx="12192000" cy="6858000"/>
   <p:notesSz cx="6858000" cy="9144000"/>
@@ -115,7 +123,445 @@
       </a:defRPr>
     </a:lvl9pPr>
   </p:defaultTextStyle>
+  <p:extLst>
+    <p:ext uri="{EFAFB233-063F-42B5-8137-9DF3F51BA10A}">
+      <p15:sldGuideLst xmlns:p15="http://schemas.microsoft.com/office/powerpoint/2012/main"/>
+    </p:ext>
+  </p:extLst>
 </p:presentation>
+</file>
+
+<file path=ppt/notesMasters/notesMaster1.xml><?xml version="1.0" encoding="utf-8"?>
+<p:notesMaster xmlns:a="http://schemas.openxmlformats.org/drawingml/2006/main" xmlns:r="http://schemas.openxmlformats.org/officeDocument/2006/relationships" xmlns:p="http://schemas.openxmlformats.org/presentationml/2006/main">
+  <p:cSld>
+    <p:bg>
+      <p:bgRef idx="1001">
+        <a:schemeClr val="bg1"/>
+      </p:bgRef>
+    </p:bg>
+    <p:spTree>
+      <p:nvGrpSpPr>
+        <p:cNvPr id="1" name=""/>
+        <p:cNvGrpSpPr/>
+        <p:nvPr/>
+      </p:nvGrpSpPr>
+      <p:grpSpPr>
+        <a:xfrm>
+          <a:off x="0" y="0"/>
+          <a:ext cx="0" cy="0"/>
+          <a:chOff x="0" y="0"/>
+          <a:chExt cx="0" cy="0"/>
+        </a:xfrm>
+      </p:grpSpPr>
+      <p:sp>
+        <p:nvSpPr>
+          <p:cNvPr id="2" name="Označba mesta glave 1"/>
+          <p:cNvSpPr>
+            <a:spLocks noGrp="1"/>
+          </p:cNvSpPr>
+          <p:nvPr>
+            <p:ph type="hdr" sz="quarter"/>
+          </p:nvPr>
+        </p:nvSpPr>
+        <p:spPr>
+          <a:xfrm>
+            <a:off x="0" y="0"/>
+            <a:ext cx="2971800" cy="458788"/>
+          </a:xfrm>
+          <a:prstGeom prst="rect">
+            <a:avLst/>
+          </a:prstGeom>
+        </p:spPr>
+        <p:txBody>
+          <a:bodyPr vert="horz" lIns="91440" tIns="45720" rIns="91440" bIns="45720" rtlCol="0"/>
+          <a:lstStyle>
+            <a:lvl1pPr algn="l">
+              <a:defRPr sz="1200"/>
+            </a:lvl1pPr>
+          </a:lstStyle>
+          <a:p>
+            <a:endParaRPr lang="sl-SI"/>
+          </a:p>
+        </p:txBody>
+      </p:sp>
+      <p:sp>
+        <p:nvSpPr>
+          <p:cNvPr id="3" name="Označba mesta datuma 2"/>
+          <p:cNvSpPr>
+            <a:spLocks noGrp="1"/>
+          </p:cNvSpPr>
+          <p:nvPr>
+            <p:ph type="dt" idx="1"/>
+          </p:nvPr>
+        </p:nvSpPr>
+        <p:spPr>
+          <a:xfrm>
+            <a:off x="3884613" y="0"/>
+            <a:ext cx="2971800" cy="458788"/>
+          </a:xfrm>
+          <a:prstGeom prst="rect">
+            <a:avLst/>
+          </a:prstGeom>
+        </p:spPr>
+        <p:txBody>
+          <a:bodyPr vert="horz" lIns="91440" tIns="45720" rIns="91440" bIns="45720" rtlCol="0"/>
+          <a:lstStyle>
+            <a:lvl1pPr algn="r">
+              <a:defRPr sz="1200"/>
+            </a:lvl1pPr>
+          </a:lstStyle>
+          <a:p>
+            <a:fld id="{CA760EBF-34A3-402A-8402-06C8F4AA9996}" type="datetimeFigureOut">
+              <a:rPr lang="sl-SI" smtClean="0"/>
+              <a:t>14. 01. 2019</a:t>
+            </a:fld>
+            <a:endParaRPr lang="sl-SI"/>
+          </a:p>
+        </p:txBody>
+      </p:sp>
+      <p:sp>
+        <p:nvSpPr>
+          <p:cNvPr id="4" name="Označba mesta stranske slike 3"/>
+          <p:cNvSpPr>
+            <a:spLocks noGrp="1" noRot="1" noChangeAspect="1"/>
+          </p:cNvSpPr>
+          <p:nvPr>
+            <p:ph type="sldImg" idx="2"/>
+          </p:nvPr>
+        </p:nvSpPr>
+        <p:spPr>
+          <a:xfrm>
+            <a:off x="685800" y="1143000"/>
+            <a:ext cx="5486400" cy="3086100"/>
+          </a:xfrm>
+          <a:prstGeom prst="rect">
+            <a:avLst/>
+          </a:prstGeom>
+          <a:noFill/>
+          <a:ln w="12700">
+            <a:solidFill>
+              <a:prstClr val="black"/>
+            </a:solidFill>
+          </a:ln>
+        </p:spPr>
+        <p:txBody>
+          <a:bodyPr vert="horz" lIns="91440" tIns="45720" rIns="91440" bIns="45720" rtlCol="0" anchor="ctr"/>
+          <a:lstStyle/>
+          <a:p>
+            <a:endParaRPr lang="sl-SI"/>
+          </a:p>
+        </p:txBody>
+      </p:sp>
+      <p:sp>
+        <p:nvSpPr>
+          <p:cNvPr id="5" name="Označba mesta opomb 4"/>
+          <p:cNvSpPr>
+            <a:spLocks noGrp="1"/>
+          </p:cNvSpPr>
+          <p:nvPr>
+            <p:ph type="body" sz="quarter" idx="3"/>
+          </p:nvPr>
+        </p:nvSpPr>
+        <p:spPr>
+          <a:xfrm>
+            <a:off x="685800" y="4400550"/>
+            <a:ext cx="5486400" cy="3600450"/>
+          </a:xfrm>
+          <a:prstGeom prst="rect">
+            <a:avLst/>
+          </a:prstGeom>
+        </p:spPr>
+        <p:txBody>
+          <a:bodyPr vert="horz" lIns="91440" tIns="45720" rIns="91440" bIns="45720" rtlCol="0"/>
+          <a:lstStyle/>
+          <a:p>
+            <a:pPr lvl="0"/>
+            <a:r>
+              <a:rPr lang="sl-SI"/>
+              <a:t>Uredite sloge besedila matrice</a:t>
+            </a:r>
+          </a:p>
+          <a:p>
+            <a:pPr lvl="1"/>
+            <a:r>
+              <a:rPr lang="sl-SI"/>
+              <a:t>Druga raven</a:t>
+            </a:r>
+          </a:p>
+          <a:p>
+            <a:pPr lvl="2"/>
+            <a:r>
+              <a:rPr lang="sl-SI"/>
+              <a:t>Tretja raven</a:t>
+            </a:r>
+          </a:p>
+          <a:p>
+            <a:pPr lvl="3"/>
+            <a:r>
+              <a:rPr lang="sl-SI"/>
+              <a:t>Četrta raven</a:t>
+            </a:r>
+          </a:p>
+          <a:p>
+            <a:pPr lvl="4"/>
+            <a:r>
+              <a:rPr lang="sl-SI"/>
+              <a:t>Peta raven</a:t>
+            </a:r>
+          </a:p>
+        </p:txBody>
+      </p:sp>
+      <p:sp>
+        <p:nvSpPr>
+          <p:cNvPr id="6" name="Označba mesta noge 5"/>
+          <p:cNvSpPr>
+            <a:spLocks noGrp="1"/>
+          </p:cNvSpPr>
+          <p:nvPr>
+            <p:ph type="ftr" sz="quarter" idx="4"/>
+          </p:nvPr>
+        </p:nvSpPr>
+        <p:spPr>
+          <a:xfrm>
+            <a:off x="0" y="8685213"/>
+            <a:ext cx="2971800" cy="458787"/>
+          </a:xfrm>
+          <a:prstGeom prst="rect">
+            <a:avLst/>
+          </a:prstGeom>
+        </p:spPr>
+        <p:txBody>
+          <a:bodyPr vert="horz" lIns="91440" tIns="45720" rIns="91440" bIns="45720" rtlCol="0" anchor="b"/>
+          <a:lstStyle>
+            <a:lvl1pPr algn="l">
+              <a:defRPr sz="1200"/>
+            </a:lvl1pPr>
+          </a:lstStyle>
+          <a:p>
+            <a:endParaRPr lang="sl-SI"/>
+          </a:p>
+        </p:txBody>
+      </p:sp>
+      <p:sp>
+        <p:nvSpPr>
+          <p:cNvPr id="7" name="Označba mesta številke diapozitiva 6"/>
+          <p:cNvSpPr>
+            <a:spLocks noGrp="1"/>
+          </p:cNvSpPr>
+          <p:nvPr>
+            <p:ph type="sldNum" sz="quarter" idx="5"/>
+          </p:nvPr>
+        </p:nvSpPr>
+        <p:spPr>
+          <a:xfrm>
+            <a:off x="3884613" y="8685213"/>
+            <a:ext cx="2971800" cy="458787"/>
+          </a:xfrm>
+          <a:prstGeom prst="rect">
+            <a:avLst/>
+          </a:prstGeom>
+        </p:spPr>
+        <p:txBody>
+          <a:bodyPr vert="horz" lIns="91440" tIns="45720" rIns="91440" bIns="45720" rtlCol="0" anchor="b"/>
+          <a:lstStyle>
+            <a:lvl1pPr algn="r">
+              <a:defRPr sz="1200"/>
+            </a:lvl1pPr>
+          </a:lstStyle>
+          <a:p>
+            <a:fld id="{0CB21998-E0A9-4668-B57E-B7E756FFC236}" type="slidenum">
+              <a:rPr lang="sl-SI" smtClean="0"/>
+              <a:t>‹#›</a:t>
+            </a:fld>
+            <a:endParaRPr lang="sl-SI"/>
+          </a:p>
+        </p:txBody>
+      </p:sp>
+    </p:spTree>
+    <p:extLst>
+      <p:ext uri="{BB962C8B-B14F-4D97-AF65-F5344CB8AC3E}">
+        <p14:creationId xmlns:p14="http://schemas.microsoft.com/office/powerpoint/2010/main" val="3810741116"/>
+      </p:ext>
+    </p:extLst>
+  </p:cSld>
+  <p:clrMap bg1="lt1" tx1="dk1" bg2="lt2" tx2="dk2" accent1="accent1" accent2="accent2" accent3="accent3" accent4="accent4" accent5="accent5" accent6="accent6" hlink="hlink" folHlink="folHlink"/>
+  <p:notesStyle>
+    <a:lvl1pPr marL="0" algn="l" defTabSz="914400" rtl="0" eaLnBrk="1" latinLnBrk="0" hangingPunct="1">
+      <a:defRPr sz="1200" kern="1200">
+        <a:solidFill>
+          <a:schemeClr val="tx1"/>
+        </a:solidFill>
+        <a:latin typeface="+mn-lt"/>
+        <a:ea typeface="+mn-ea"/>
+        <a:cs typeface="+mn-cs"/>
+      </a:defRPr>
+    </a:lvl1pPr>
+    <a:lvl2pPr marL="457200" algn="l" defTabSz="914400" rtl="0" eaLnBrk="1" latinLnBrk="0" hangingPunct="1">
+      <a:defRPr sz="1200" kern="1200">
+        <a:solidFill>
+          <a:schemeClr val="tx1"/>
+        </a:solidFill>
+        <a:latin typeface="+mn-lt"/>
+        <a:ea typeface="+mn-ea"/>
+        <a:cs typeface="+mn-cs"/>
+      </a:defRPr>
+    </a:lvl2pPr>
+    <a:lvl3pPr marL="914400" algn="l" defTabSz="914400" rtl="0" eaLnBrk="1" latinLnBrk="0" hangingPunct="1">
+      <a:defRPr sz="1200" kern="1200">
+        <a:solidFill>
+          <a:schemeClr val="tx1"/>
+        </a:solidFill>
+        <a:latin typeface="+mn-lt"/>
+        <a:ea typeface="+mn-ea"/>
+        <a:cs typeface="+mn-cs"/>
+      </a:defRPr>
+    </a:lvl3pPr>
+    <a:lvl4pPr marL="1371600" algn="l" defTabSz="914400" rtl="0" eaLnBrk="1" latinLnBrk="0" hangingPunct="1">
+      <a:defRPr sz="1200" kern="1200">
+        <a:solidFill>
+          <a:schemeClr val="tx1"/>
+        </a:solidFill>
+        <a:latin typeface="+mn-lt"/>
+        <a:ea typeface="+mn-ea"/>
+        <a:cs typeface="+mn-cs"/>
+      </a:defRPr>
+    </a:lvl4pPr>
+    <a:lvl5pPr marL="1828800" algn="l" defTabSz="914400" rtl="0" eaLnBrk="1" latinLnBrk="0" hangingPunct="1">
+      <a:defRPr sz="1200" kern="1200">
+        <a:solidFill>
+          <a:schemeClr val="tx1"/>
+        </a:solidFill>
+        <a:latin typeface="+mn-lt"/>
+        <a:ea typeface="+mn-ea"/>
+        <a:cs typeface="+mn-cs"/>
+      </a:defRPr>
+    </a:lvl5pPr>
+    <a:lvl6pPr marL="2286000" algn="l" defTabSz="914400" rtl="0" eaLnBrk="1" latinLnBrk="0" hangingPunct="1">
+      <a:defRPr sz="1200" kern="1200">
+        <a:solidFill>
+          <a:schemeClr val="tx1"/>
+        </a:solidFill>
+        <a:latin typeface="+mn-lt"/>
+        <a:ea typeface="+mn-ea"/>
+        <a:cs typeface="+mn-cs"/>
+      </a:defRPr>
+    </a:lvl6pPr>
+    <a:lvl7pPr marL="2743200" algn="l" defTabSz="914400" rtl="0" eaLnBrk="1" latinLnBrk="0" hangingPunct="1">
+      <a:defRPr sz="1200" kern="1200">
+        <a:solidFill>
+          <a:schemeClr val="tx1"/>
+        </a:solidFill>
+        <a:latin typeface="+mn-lt"/>
+        <a:ea typeface="+mn-ea"/>
+        <a:cs typeface="+mn-cs"/>
+      </a:defRPr>
+    </a:lvl7pPr>
+    <a:lvl8pPr marL="3200400" algn="l" defTabSz="914400" rtl="0" eaLnBrk="1" latinLnBrk="0" hangingPunct="1">
+      <a:defRPr sz="1200" kern="1200">
+        <a:solidFill>
+          <a:schemeClr val="tx1"/>
+        </a:solidFill>
+        <a:latin typeface="+mn-lt"/>
+        <a:ea typeface="+mn-ea"/>
+        <a:cs typeface="+mn-cs"/>
+      </a:defRPr>
+    </a:lvl8pPr>
+    <a:lvl9pPr marL="3657600" algn="l" defTabSz="914400" rtl="0" eaLnBrk="1" latinLnBrk="0" hangingPunct="1">
+      <a:defRPr sz="1200" kern="1200">
+        <a:solidFill>
+          <a:schemeClr val="tx1"/>
+        </a:solidFill>
+        <a:latin typeface="+mn-lt"/>
+        <a:ea typeface="+mn-ea"/>
+        <a:cs typeface="+mn-cs"/>
+      </a:defRPr>
+    </a:lvl9pPr>
+  </p:notesStyle>
+</p:notesMaster>
+</file>
+
+<file path=ppt/notesSlides/notesSlide1.xml><?xml version="1.0" encoding="utf-8"?>
+<p:notes xmlns:a="http://schemas.openxmlformats.org/drawingml/2006/main" xmlns:r="http://schemas.openxmlformats.org/officeDocument/2006/relationships" xmlns:p="http://schemas.openxmlformats.org/presentationml/2006/main">
+  <p:cSld>
+    <p:spTree>
+      <p:nvGrpSpPr>
+        <p:cNvPr id="1" name=""/>
+        <p:cNvGrpSpPr/>
+        <p:nvPr/>
+      </p:nvGrpSpPr>
+      <p:grpSpPr>
+        <a:xfrm>
+          <a:off x="0" y="0"/>
+          <a:ext cx="0" cy="0"/>
+          <a:chOff x="0" y="0"/>
+          <a:chExt cx="0" cy="0"/>
+        </a:xfrm>
+      </p:grpSpPr>
+      <p:sp>
+        <p:nvSpPr>
+          <p:cNvPr id="2" name="Označba mesta stranske slike 1"/>
+          <p:cNvSpPr>
+            <a:spLocks noGrp="1" noRot="1" noChangeAspect="1"/>
+          </p:cNvSpPr>
+          <p:nvPr>
+            <p:ph type="sldImg"/>
+          </p:nvPr>
+        </p:nvSpPr>
+        <p:spPr/>
+      </p:sp>
+      <p:sp>
+        <p:nvSpPr>
+          <p:cNvPr id="3" name="Označba mesta opomb 2"/>
+          <p:cNvSpPr>
+            <a:spLocks noGrp="1"/>
+          </p:cNvSpPr>
+          <p:nvPr>
+            <p:ph type="body" idx="1"/>
+          </p:nvPr>
+        </p:nvSpPr>
+        <p:spPr/>
+        <p:txBody>
+          <a:bodyPr/>
+          <a:lstStyle/>
+          <a:p>
+            <a:endParaRPr lang="sl-SI" dirty="0"/>
+          </a:p>
+        </p:txBody>
+      </p:sp>
+      <p:sp>
+        <p:nvSpPr>
+          <p:cNvPr id="4" name="Označba mesta številke diapozitiva 3"/>
+          <p:cNvSpPr>
+            <a:spLocks noGrp="1"/>
+          </p:cNvSpPr>
+          <p:nvPr>
+            <p:ph type="sldNum" sz="quarter" idx="5"/>
+          </p:nvPr>
+        </p:nvSpPr>
+        <p:spPr/>
+        <p:txBody>
+          <a:bodyPr/>
+          <a:lstStyle/>
+          <a:p>
+            <a:fld id="{0CB21998-E0A9-4668-B57E-B7E756FFC236}" type="slidenum">
+              <a:rPr lang="sl-SI" smtClean="0"/>
+              <a:t>17</a:t>
+            </a:fld>
+            <a:endParaRPr lang="sl-SI"/>
+          </a:p>
+        </p:txBody>
+      </p:sp>
+    </p:spTree>
+    <p:extLst>
+      <p:ext uri="{BB962C8B-B14F-4D97-AF65-F5344CB8AC3E}">
+        <p14:creationId xmlns:p14="http://schemas.microsoft.com/office/powerpoint/2010/main" val="3325081610"/>
+      </p:ext>
+    </p:extLst>
+  </p:cSld>
+  <p:clrMapOvr>
+    <a:masterClrMapping/>
+  </p:clrMapOvr>
+</p:notes>
 </file>
 
 <file path=ppt/slideLayouts/slideLayout1.xml><?xml version="1.0" encoding="utf-8"?>
@@ -5992,26 +6438,42 @@
         </p:nvSpPr>
         <p:spPr/>
         <p:txBody>
-          <a:bodyPr>
-            <a:normAutofit lnSpcReduction="10000"/>
-          </a:bodyPr>
-          <a:lstStyle/>
+          <a:bodyPr/>
+          <a:lstStyle/>
+          <a:p>
+            <a:r>
+              <a:rPr lang="sl-SI" dirty="0"/>
+              <a:t>Q: </a:t>
+            </a:r>
+            <a:r>
+              <a:rPr lang="en-US" dirty="0"/>
+              <a:t>How does </a:t>
+            </a:r>
+            <a:r>
+              <a:rPr lang="en-US" dirty="0" err="1"/>
+              <a:t>Shiranna</a:t>
+            </a:r>
+            <a:r>
+              <a:rPr lang="en-US" dirty="0"/>
+              <a:t> feel as the shuttle is taking off?</a:t>
+            </a:r>
+            <a:endParaRPr lang="sl-SI" dirty="0"/>
+          </a:p>
+          <a:p>
+            <a:endParaRPr lang="sl-SI" dirty="0"/>
+          </a:p>
           <a:p>
             <a:r>
               <a:rPr lang="sl-SI" dirty="0"/>
               <a:t>A1: </a:t>
             </a:r>
             <a:r>
+              <a:rPr lang="en-US" dirty="0" err="1"/>
+              <a:t>Shiranna</a:t>
+            </a:r>
+            <a:r>
               <a:rPr lang="en-US" dirty="0"/>
-              <a:t>both </a:t>
-            </a:r>
-            <a:r>
-              <a:rPr lang="sl-SI" dirty="0" err="1"/>
-              <a:t>excite</a:t>
-            </a:r>
-            <a:r>
-              <a:rPr lang="en-US" dirty="0"/>
-              <a:t> nervous</a:t>
+              <a:t> feels both excited and nervous as the shuttle is taking off.</a:t>
             </a:r>
             <a:endParaRPr lang="sl-SI" dirty="0"/>
           </a:p>
@@ -6021,20 +6483,8 @@
               <a:t>A2: </a:t>
             </a:r>
             <a:r>
-              <a:rPr lang="sl-SI" dirty="0" err="1"/>
-              <a:t>nervous</a:t>
-            </a:r>
-            <a:r>
               <a:rPr lang="en-US" dirty="0"/>
-              <a:t> but also </a:t>
-            </a:r>
-            <a:r>
-              <a:rPr lang="sl-SI" dirty="0" err="1"/>
-              <a:t>excite</a:t>
-            </a:r>
-            <a:r>
-              <a:rPr lang="en-US" dirty="0"/>
-              <a:t> to with mother</a:t>
+              <a:t>Nervous, but also excited to be with her mother.</a:t>
             </a:r>
             <a:endParaRPr lang="sl-SI" dirty="0"/>
           </a:p>
@@ -6044,83 +6494,28 @@
               <a:t>A3: </a:t>
             </a:r>
             <a:r>
+              <a:rPr lang="en-US" dirty="0"/>
+              <a:t>she is excited and scared</a:t>
+            </a:r>
+            <a:endParaRPr lang="sl-SI" dirty="0"/>
+          </a:p>
+          <a:p>
+            <a:endParaRPr lang="sl-SI" dirty="0"/>
+          </a:p>
+          <a:p>
+            <a:r>
               <a:rPr lang="sl-SI" dirty="0" err="1"/>
-              <a:t>excite</a:t>
-            </a:r>
-            <a:r>
-              <a:rPr lang="en-US" dirty="0"/>
-              <a:t> </a:t>
-            </a:r>
-            <a:r>
-              <a:rPr lang="sl-SI" dirty="0" err="1"/>
-              <a:t>scare</a:t>
-            </a:r>
-            <a:endParaRPr lang="sl-SI" dirty="0"/>
-          </a:p>
-          <a:p>
-            <a:endParaRPr lang="sl-SI" dirty="0"/>
-          </a:p>
-          <a:p>
+              <a:t>Predprocesiranje</a:t>
+            </a:r>
             <a:r>
               <a:rPr lang="sl-SI" dirty="0"/>
-              <a:t>Če se beseda pojavi v več odgovorih, je pomembna</a:t>
+              <a:t> + odstranimo besede, ki se pojavijo v vprašanju</a:t>
             </a:r>
           </a:p>
           <a:p>
             <a:pPr marL="0" indent="0">
               <a:buNone/>
             </a:pPr>
-            <a:endParaRPr lang="sl-SI" dirty="0"/>
-          </a:p>
-          <a:p>
-            <a:r>
-              <a:rPr lang="sl-SI" dirty="0"/>
-              <a:t>Za vsak odgovor:</a:t>
-            </a:r>
-          </a:p>
-          <a:p>
-            <a:pPr lvl="1"/>
-            <a:r>
-              <a:rPr lang="sl-SI" dirty="0"/>
-              <a:t>Izračunaj povprečno podobnost z ostalimi odgovori – </a:t>
-            </a:r>
-            <a:r>
-              <a:rPr lang="sl-SI" dirty="0" err="1"/>
-              <a:t>baseline</a:t>
-            </a:r>
-            <a:endParaRPr lang="sl-SI" dirty="0"/>
-          </a:p>
-          <a:p>
-            <a:pPr lvl="1"/>
-            <a:r>
-              <a:rPr lang="sl-SI" dirty="0"/>
-              <a:t>Izmenično odstranjuj besede in primerjaj podobnost</a:t>
-            </a:r>
-          </a:p>
-          <a:p>
-            <a:pPr lvl="1"/>
-            <a:r>
-              <a:rPr lang="sl-SI" dirty="0"/>
-              <a:t>Če je podobnost manjša, je beseda pomembna</a:t>
-            </a:r>
-          </a:p>
-          <a:p>
-            <a:pPr lvl="1"/>
-            <a:endParaRPr lang="sl-SI" dirty="0"/>
-          </a:p>
-          <a:p>
-            <a:pPr marL="0" indent="0">
-              <a:buNone/>
-            </a:pPr>
-            <a:endParaRPr lang="sl-SI" dirty="0"/>
-          </a:p>
-          <a:p>
-            <a:pPr marL="0" indent="0">
-              <a:buNone/>
-            </a:pPr>
-            <a:endParaRPr lang="sl-SI" dirty="0"/>
-          </a:p>
-          <a:p>
             <a:endParaRPr lang="sl-SI" dirty="0"/>
           </a:p>
         </p:txBody>
@@ -6128,7 +6523,7 @@
     </p:spTree>
     <p:extLst>
       <p:ext uri="{BB962C8B-B14F-4D97-AF65-F5344CB8AC3E}">
-        <p14:creationId xmlns:p14="http://schemas.microsoft.com/office/powerpoint/2010/main" val="1807974183"/>
+        <p14:creationId xmlns:p14="http://schemas.microsoft.com/office/powerpoint/2010/main" val="1235242580"/>
       </p:ext>
     </p:extLst>
   </p:cSld>
@@ -6201,26 +6596,38 @@
         </p:nvSpPr>
         <p:spPr/>
         <p:txBody>
-          <a:bodyPr>
-            <a:normAutofit lnSpcReduction="10000"/>
-          </a:bodyPr>
+          <a:bodyPr/>
           <a:lstStyle/>
           <a:p>
             <a:r>
               <a:rPr lang="sl-SI" dirty="0"/>
-              <a:t>A1: </a:t>
+              <a:t>Q: </a:t>
             </a:r>
             <a:r>
               <a:rPr lang="en-US" dirty="0"/>
-              <a:t>both </a:t>
-            </a:r>
-            <a:r>
-              <a:rPr lang="sl-SI" dirty="0" err="1">
+              <a:t>How does </a:t>
+            </a:r>
+            <a:r>
+              <a:rPr lang="en-US" dirty="0" err="1">
                 <a:solidFill>
                   <a:srgbClr val="FF0000"/>
                 </a:solidFill>
               </a:rPr>
-              <a:t>excite</a:t>
+              <a:t>Shiranna</a:t>
+            </a:r>
+            <a:r>
+              <a:rPr lang="en-US" dirty="0"/>
+              <a:t> </a:t>
+            </a:r>
+            <a:r>
+              <a:rPr lang="en-US" dirty="0">
+                <a:solidFill>
+                  <a:schemeClr val="accent6">
+                    <a:lumMod val="75000"/>
+                  </a:schemeClr>
+                </a:solidFill>
+              </a:rPr>
+              <a:t>feel</a:t>
             </a:r>
             <a:r>
               <a:rPr lang="en-US" dirty="0"/>
@@ -6232,42 +6639,137 @@
                   <a:srgbClr val="00B0F0"/>
                 </a:solidFill>
               </a:rPr>
-              <a:t>nervous</a:t>
-            </a:r>
-            <a:endParaRPr lang="sl-SI" dirty="0">
-              <a:solidFill>
-                <a:srgbClr val="00B0F0"/>
-              </a:solidFill>
-            </a:endParaRPr>
-          </a:p>
-          <a:p>
-            <a:r>
-              <a:rPr lang="sl-SI" dirty="0"/>
-              <a:t>A2: </a:t>
-            </a:r>
-            <a:r>
-              <a:rPr lang="sl-SI" dirty="0" err="1">
+              <a:t>as the shuttle</a:t>
+            </a:r>
+            <a:r>
+              <a:rPr lang="en-US" dirty="0"/>
+              <a:t> </a:t>
+            </a:r>
+            <a:r>
+              <a:rPr lang="en-US" dirty="0">
+                <a:solidFill>
+                  <a:srgbClr val="FFC000"/>
+                </a:solidFill>
+              </a:rPr>
+              <a:t>is</a:t>
+            </a:r>
+            <a:r>
+              <a:rPr lang="en-US" dirty="0"/>
+              <a:t> </a:t>
+            </a:r>
+            <a:r>
+              <a:rPr lang="en-US" dirty="0">
                 <a:solidFill>
                   <a:srgbClr val="00B0F0"/>
                 </a:solidFill>
               </a:rPr>
-              <a:t>nervous</a:t>
+              <a:t>taking</a:t>
             </a:r>
             <a:r>
               <a:rPr lang="en-US" dirty="0"/>
-              <a:t> but also </a:t>
-            </a:r>
-            <a:r>
-              <a:rPr lang="sl-SI" dirty="0" err="1">
+              <a:t> </a:t>
+            </a:r>
+            <a:r>
+              <a:rPr lang="en-US" dirty="0">
+                <a:solidFill>
+                  <a:srgbClr val="00B0F0"/>
+                </a:solidFill>
+              </a:rPr>
+              <a:t>off</a:t>
+            </a:r>
+            <a:r>
+              <a:rPr lang="en-US" dirty="0"/>
+              <a:t>?</a:t>
+            </a:r>
+            <a:endParaRPr lang="sl-SI" dirty="0"/>
+          </a:p>
+          <a:p>
+            <a:endParaRPr lang="sl-SI" dirty="0"/>
+          </a:p>
+          <a:p>
+            <a:r>
+              <a:rPr lang="sl-SI" dirty="0"/>
+              <a:t>A1: </a:t>
+            </a:r>
+            <a:r>
+              <a:rPr lang="en-US" dirty="0" err="1">
                 <a:solidFill>
                   <a:srgbClr val="FF0000"/>
                 </a:solidFill>
               </a:rPr>
-              <a:t>excite</a:t>
+              <a:t>Shiranna</a:t>
             </a:r>
             <a:r>
               <a:rPr lang="en-US" dirty="0"/>
-              <a:t> to with mother</a:t>
+              <a:t> </a:t>
+            </a:r>
+            <a:r>
+              <a:rPr lang="en-US" dirty="0">
+                <a:solidFill>
+                  <a:schemeClr val="accent6">
+                    <a:lumMod val="75000"/>
+                  </a:schemeClr>
+                </a:solidFill>
+              </a:rPr>
+              <a:t>feels</a:t>
+            </a:r>
+            <a:r>
+              <a:rPr lang="en-US" dirty="0"/>
+              <a:t> both excited and nervous </a:t>
+            </a:r>
+            <a:r>
+              <a:rPr lang="en-US" dirty="0">
+                <a:solidFill>
+                  <a:srgbClr val="00B0F0"/>
+                </a:solidFill>
+              </a:rPr>
+              <a:t>as the shuttle </a:t>
+            </a:r>
+            <a:r>
+              <a:rPr lang="en-US" dirty="0">
+                <a:solidFill>
+                  <a:schemeClr val="accent3">
+                    <a:lumMod val="60000"/>
+                    <a:lumOff val="40000"/>
+                  </a:schemeClr>
+                </a:solidFill>
+              </a:rPr>
+              <a:t>is</a:t>
+            </a:r>
+            <a:r>
+              <a:rPr lang="en-US" dirty="0">
+                <a:solidFill>
+                  <a:srgbClr val="00B0F0"/>
+                </a:solidFill>
+              </a:rPr>
+              <a:t> taking off</a:t>
+            </a:r>
+            <a:r>
+              <a:rPr lang="en-US" dirty="0"/>
+              <a:t>.</a:t>
+            </a:r>
+            <a:endParaRPr lang="sl-SI" dirty="0"/>
+          </a:p>
+          <a:p>
+            <a:r>
+              <a:rPr lang="sl-SI" dirty="0"/>
+              <a:t>A2: </a:t>
+            </a:r>
+            <a:r>
+              <a:rPr lang="en-US" dirty="0"/>
+              <a:t>Nervous, but also excited to </a:t>
+            </a:r>
+            <a:r>
+              <a:rPr lang="en-US" dirty="0">
+                <a:solidFill>
+                  <a:srgbClr val="FFC000"/>
+                </a:solidFill>
+              </a:rPr>
+              <a:t>be</a:t>
+            </a:r>
+            <a:r>
+              <a:rPr lang="en-US" dirty="0"/>
+              <a:t> with her mother.</a:t>
             </a:r>
             <a:endParaRPr lang="sl-SI" dirty="0"/>
           </a:p>
@@ -6277,31 +6779,25 @@
               <a:t>A3: </a:t>
             </a:r>
             <a:r>
-              <a:rPr lang="sl-SI" dirty="0" err="1">
+              <a:rPr lang="en-US" dirty="0"/>
+              <a:t>she </a:t>
+            </a:r>
+            <a:r>
+              <a:rPr lang="en-US" dirty="0">
                 <a:solidFill>
-                  <a:srgbClr val="FF0000"/>
+                  <a:schemeClr val="accent4">
+                    <a:lumMod val="60000"/>
+                    <a:lumOff val="40000"/>
+                  </a:schemeClr>
                 </a:solidFill>
               </a:rPr>
-              <a:t>excite</a:t>
+              <a:t>is</a:t>
             </a:r>
             <a:r>
               <a:rPr lang="en-US" dirty="0"/>
-              <a:t> </a:t>
-            </a:r>
-            <a:r>
-              <a:rPr lang="sl-SI" dirty="0" err="1"/>
-              <a:t>scare</a:t>
+              <a:t> excited and scared</a:t>
             </a:r>
             <a:endParaRPr lang="sl-SI" dirty="0"/>
-          </a:p>
-          <a:p>
-            <a:endParaRPr lang="sl-SI" dirty="0"/>
-          </a:p>
-          <a:p>
-            <a:r>
-              <a:rPr lang="sl-SI" dirty="0"/>
-              <a:t>Če se beseda pojavi v več odgovorih, je pomembna</a:t>
-            </a:r>
           </a:p>
           <a:p>
             <a:pPr marL="0" indent="0">
@@ -6310,51 +6806,6 @@
             <a:endParaRPr lang="sl-SI" dirty="0"/>
           </a:p>
           <a:p>
-            <a:r>
-              <a:rPr lang="sl-SI" dirty="0"/>
-              <a:t>Za vsak odgovor:</a:t>
-            </a:r>
-          </a:p>
-          <a:p>
-            <a:pPr lvl="1"/>
-            <a:r>
-              <a:rPr lang="sl-SI" dirty="0"/>
-              <a:t>Izračunaj povprečno podobnost z ostalimi odgovori – </a:t>
-            </a:r>
-            <a:r>
-              <a:rPr lang="sl-SI" dirty="0" err="1"/>
-              <a:t>baseline</a:t>
-            </a:r>
-            <a:endParaRPr lang="sl-SI" dirty="0"/>
-          </a:p>
-          <a:p>
-            <a:pPr lvl="1"/>
-            <a:r>
-              <a:rPr lang="sl-SI" dirty="0"/>
-              <a:t>Izmenično odstranjuj besede in primerjaj podobnost</a:t>
-            </a:r>
-          </a:p>
-          <a:p>
-            <a:pPr lvl="1"/>
-            <a:r>
-              <a:rPr lang="sl-SI" dirty="0"/>
-              <a:t>Če je podobnost manjša, je beseda pomembna</a:t>
-            </a:r>
-          </a:p>
-          <a:p>
-            <a:pPr lvl="1"/>
-            <a:endParaRPr lang="sl-SI" dirty="0"/>
-          </a:p>
-          <a:p>
-            <a:pPr marL="0" indent="0">
-              <a:buNone/>
-            </a:pPr>
-            <a:endParaRPr lang="sl-SI" dirty="0"/>
-          </a:p>
-          <a:p>
-            <a:pPr marL="0" indent="0">
-              <a:buNone/>
-            </a:pPr>
             <a:endParaRPr lang="sl-SI" dirty="0"/>
           </a:p>
           <a:p>
@@ -6365,7 +6816,7 @@
     </p:spTree>
     <p:extLst>
       <p:ext uri="{BB962C8B-B14F-4D97-AF65-F5344CB8AC3E}">
-        <p14:creationId xmlns:p14="http://schemas.microsoft.com/office/powerpoint/2010/main" val="1241269214"/>
+        <p14:creationId xmlns:p14="http://schemas.microsoft.com/office/powerpoint/2010/main" val="2070099628"/>
       </p:ext>
     </p:extLst>
   </p:cSld>
@@ -6438,6 +6889,865 @@
         </p:nvSpPr>
         <p:spPr/>
         <p:txBody>
+          <a:bodyPr/>
+          <a:lstStyle/>
+          <a:p>
+            <a:r>
+              <a:rPr lang="sl-SI" dirty="0"/>
+              <a:t>Q: </a:t>
+            </a:r>
+            <a:r>
+              <a:rPr lang="en-US" dirty="0"/>
+              <a:t>How does </a:t>
+            </a:r>
+            <a:r>
+              <a:rPr lang="en-US" dirty="0" err="1">
+                <a:solidFill>
+                  <a:srgbClr val="FF0000"/>
+                </a:solidFill>
+              </a:rPr>
+              <a:t>Shiranna</a:t>
+            </a:r>
+            <a:r>
+              <a:rPr lang="en-US" dirty="0"/>
+              <a:t> </a:t>
+            </a:r>
+            <a:r>
+              <a:rPr lang="en-US" dirty="0">
+                <a:solidFill>
+                  <a:schemeClr val="accent6">
+                    <a:lumMod val="75000"/>
+                  </a:schemeClr>
+                </a:solidFill>
+              </a:rPr>
+              <a:t>feel</a:t>
+            </a:r>
+            <a:r>
+              <a:rPr lang="en-US" dirty="0"/>
+              <a:t> </a:t>
+            </a:r>
+            <a:r>
+              <a:rPr lang="en-US" dirty="0">
+                <a:solidFill>
+                  <a:srgbClr val="00B0F0"/>
+                </a:solidFill>
+              </a:rPr>
+              <a:t>as the shuttle</a:t>
+            </a:r>
+            <a:r>
+              <a:rPr lang="en-US" dirty="0"/>
+              <a:t> </a:t>
+            </a:r>
+            <a:r>
+              <a:rPr lang="en-US" dirty="0">
+                <a:solidFill>
+                  <a:srgbClr val="FFC000"/>
+                </a:solidFill>
+              </a:rPr>
+              <a:t>is</a:t>
+            </a:r>
+            <a:r>
+              <a:rPr lang="en-US" dirty="0"/>
+              <a:t> </a:t>
+            </a:r>
+            <a:r>
+              <a:rPr lang="en-US" dirty="0">
+                <a:solidFill>
+                  <a:srgbClr val="00B0F0"/>
+                </a:solidFill>
+              </a:rPr>
+              <a:t>taking</a:t>
+            </a:r>
+            <a:r>
+              <a:rPr lang="en-US" dirty="0"/>
+              <a:t> </a:t>
+            </a:r>
+            <a:r>
+              <a:rPr lang="en-US" dirty="0">
+                <a:solidFill>
+                  <a:srgbClr val="00B0F0"/>
+                </a:solidFill>
+              </a:rPr>
+              <a:t>off</a:t>
+            </a:r>
+            <a:r>
+              <a:rPr lang="en-US" dirty="0"/>
+              <a:t>?</a:t>
+            </a:r>
+            <a:endParaRPr lang="sl-SI" dirty="0"/>
+          </a:p>
+          <a:p>
+            <a:endParaRPr lang="sl-SI" dirty="0"/>
+          </a:p>
+          <a:p>
+            <a:r>
+              <a:rPr lang="sl-SI" dirty="0"/>
+              <a:t>A1: </a:t>
+            </a:r>
+            <a:r>
+              <a:rPr lang="en-US" dirty="0"/>
+              <a:t>both </a:t>
+            </a:r>
+            <a:r>
+              <a:rPr lang="sl-SI" dirty="0" err="1"/>
+              <a:t>excite</a:t>
+            </a:r>
+            <a:r>
+              <a:rPr lang="en-US" dirty="0"/>
+              <a:t> and nervous</a:t>
+            </a:r>
+            <a:endParaRPr lang="sl-SI" dirty="0"/>
+          </a:p>
+          <a:p>
+            <a:r>
+              <a:rPr lang="sl-SI" dirty="0"/>
+              <a:t>A2: </a:t>
+            </a:r>
+            <a:r>
+              <a:rPr lang="sl-SI" dirty="0" err="1"/>
+              <a:t>nervous</a:t>
+            </a:r>
+            <a:r>
+              <a:rPr lang="en-US" dirty="0"/>
+              <a:t> but also </a:t>
+            </a:r>
+            <a:r>
+              <a:rPr lang="sl-SI" dirty="0" err="1"/>
+              <a:t>excite</a:t>
+            </a:r>
+            <a:r>
+              <a:rPr lang="en-US" dirty="0"/>
+              <a:t> to with her mother</a:t>
+            </a:r>
+            <a:endParaRPr lang="sl-SI" dirty="0"/>
+          </a:p>
+          <a:p>
+            <a:r>
+              <a:rPr lang="sl-SI" dirty="0"/>
+              <a:t>A3: </a:t>
+            </a:r>
+            <a:r>
+              <a:rPr lang="en-US" dirty="0"/>
+              <a:t>she excite and scare</a:t>
+            </a:r>
+            <a:endParaRPr lang="sl-SI" dirty="0"/>
+          </a:p>
+          <a:p>
+            <a:endParaRPr lang="sl-SI" dirty="0"/>
+          </a:p>
+          <a:p>
+            <a:endParaRPr lang="sl-SI" dirty="0"/>
+          </a:p>
+          <a:p>
+            <a:r>
+              <a:rPr lang="sl-SI" dirty="0"/>
+              <a:t>Dodatno odstranimo še besede kot so „</a:t>
+            </a:r>
+            <a:r>
+              <a:rPr lang="sl-SI" dirty="0" err="1"/>
+              <a:t>and</a:t>
+            </a:r>
+            <a:r>
+              <a:rPr lang="sl-SI" dirty="0"/>
+              <a:t>“, „</a:t>
+            </a:r>
+            <a:r>
+              <a:rPr lang="sl-SI" dirty="0" err="1"/>
+              <a:t>her</a:t>
+            </a:r>
+            <a:r>
+              <a:rPr lang="sl-SI" dirty="0"/>
+              <a:t>“, „</a:t>
+            </a:r>
+            <a:r>
+              <a:rPr lang="sl-SI" dirty="0" err="1"/>
+              <a:t>she</a:t>
+            </a:r>
+            <a:r>
+              <a:rPr lang="sl-SI" dirty="0"/>
+              <a:t>“, …</a:t>
+            </a:r>
+          </a:p>
+          <a:p>
+            <a:endParaRPr lang="sl-SI" dirty="0"/>
+          </a:p>
+          <a:p>
+            <a:endParaRPr lang="sl-SI" dirty="0"/>
+          </a:p>
+        </p:txBody>
+      </p:sp>
+    </p:spTree>
+    <p:extLst>
+      <p:ext uri="{BB962C8B-B14F-4D97-AF65-F5344CB8AC3E}">
+        <p14:creationId xmlns:p14="http://schemas.microsoft.com/office/powerpoint/2010/main" val="1065468224"/>
+      </p:ext>
+    </p:extLst>
+  </p:cSld>
+  <p:clrMapOvr>
+    <a:masterClrMapping/>
+  </p:clrMapOvr>
+</p:sld>
+</file>
+
+<file path=ppt/slides/slide13.xml><?xml version="1.0" encoding="utf-8"?>
+<p:sld xmlns:a="http://schemas.openxmlformats.org/drawingml/2006/main" xmlns:r="http://schemas.openxmlformats.org/officeDocument/2006/relationships" xmlns:p="http://schemas.openxmlformats.org/presentationml/2006/main">
+  <p:cSld>
+    <p:spTree>
+      <p:nvGrpSpPr>
+        <p:cNvPr id="1" name=""/>
+        <p:cNvGrpSpPr/>
+        <p:nvPr/>
+      </p:nvGrpSpPr>
+      <p:grpSpPr>
+        <a:xfrm>
+          <a:off x="0" y="0"/>
+          <a:ext cx="0" cy="0"/>
+          <a:chOff x="0" y="0"/>
+          <a:chExt cx="0" cy="0"/>
+        </a:xfrm>
+      </p:grpSpPr>
+      <p:sp>
+        <p:nvSpPr>
+          <p:cNvPr id="2" name="Naslov 1">
+            <a:extLst>
+              <a:ext uri="{FF2B5EF4-FFF2-40B4-BE49-F238E27FC236}">
+                <a16:creationId xmlns:a16="http://schemas.microsoft.com/office/drawing/2014/main" id="{8185A772-B4AC-486C-BB4F-BAE2B4C3AB30}"/>
+              </a:ext>
+            </a:extLst>
+          </p:cNvPr>
+          <p:cNvSpPr>
+            <a:spLocks noGrp="1"/>
+          </p:cNvSpPr>
+          <p:nvPr>
+            <p:ph type="title"/>
+          </p:nvPr>
+        </p:nvSpPr>
+        <p:spPr/>
+        <p:txBody>
+          <a:bodyPr/>
+          <a:lstStyle/>
+          <a:p>
+            <a:r>
+              <a:rPr lang="sl-SI" dirty="0"/>
+              <a:t>Iskanje najpomembnejših besed (primer)</a:t>
+            </a:r>
+          </a:p>
+        </p:txBody>
+      </p:sp>
+      <p:sp>
+        <p:nvSpPr>
+          <p:cNvPr id="3" name="Označba mesta vsebine 2">
+            <a:extLst>
+              <a:ext uri="{FF2B5EF4-FFF2-40B4-BE49-F238E27FC236}">
+                <a16:creationId xmlns:a16="http://schemas.microsoft.com/office/drawing/2014/main" id="{12151333-E0AF-46C0-AB18-EE808EB84ACC}"/>
+              </a:ext>
+            </a:extLst>
+          </p:cNvPr>
+          <p:cNvSpPr>
+            <a:spLocks noGrp="1"/>
+          </p:cNvSpPr>
+          <p:nvPr>
+            <p:ph idx="1"/>
+          </p:nvPr>
+        </p:nvSpPr>
+        <p:spPr/>
+        <p:txBody>
+          <a:bodyPr/>
+          <a:lstStyle/>
+          <a:p>
+            <a:r>
+              <a:rPr lang="sl-SI" dirty="0"/>
+              <a:t>A1: </a:t>
+            </a:r>
+            <a:r>
+              <a:rPr lang="en-US" dirty="0"/>
+              <a:t>both </a:t>
+            </a:r>
+            <a:r>
+              <a:rPr lang="sl-SI" dirty="0" err="1"/>
+              <a:t>excite</a:t>
+            </a:r>
+            <a:r>
+              <a:rPr lang="en-US" dirty="0"/>
+              <a:t> nervous</a:t>
+            </a:r>
+            <a:endParaRPr lang="sl-SI" dirty="0"/>
+          </a:p>
+          <a:p>
+            <a:r>
+              <a:rPr lang="sl-SI" dirty="0"/>
+              <a:t>A2: </a:t>
+            </a:r>
+            <a:r>
+              <a:rPr lang="sl-SI" dirty="0" err="1"/>
+              <a:t>nervous</a:t>
+            </a:r>
+            <a:r>
+              <a:rPr lang="en-US" dirty="0"/>
+              <a:t> but also </a:t>
+            </a:r>
+            <a:r>
+              <a:rPr lang="sl-SI" dirty="0" err="1"/>
+              <a:t>excite</a:t>
+            </a:r>
+            <a:r>
+              <a:rPr lang="en-US" dirty="0"/>
+              <a:t> to with mother</a:t>
+            </a:r>
+            <a:endParaRPr lang="sl-SI" dirty="0"/>
+          </a:p>
+          <a:p>
+            <a:r>
+              <a:rPr lang="sl-SI" dirty="0"/>
+              <a:t>A3: </a:t>
+            </a:r>
+            <a:r>
+              <a:rPr lang="sl-SI" dirty="0" err="1"/>
+              <a:t>excite</a:t>
+            </a:r>
+            <a:r>
+              <a:rPr lang="en-US" dirty="0"/>
+              <a:t> </a:t>
+            </a:r>
+            <a:r>
+              <a:rPr lang="sl-SI" dirty="0" err="1"/>
+              <a:t>scare</a:t>
+            </a:r>
+            <a:endParaRPr lang="sl-SI" dirty="0"/>
+          </a:p>
+          <a:p>
+            <a:pPr marL="0" indent="0">
+              <a:buNone/>
+            </a:pPr>
+            <a:endParaRPr lang="sl-SI" dirty="0"/>
+          </a:p>
+          <a:p>
+            <a:endParaRPr lang="sl-SI" dirty="0"/>
+          </a:p>
+        </p:txBody>
+      </p:sp>
+    </p:spTree>
+    <p:extLst>
+      <p:ext uri="{BB962C8B-B14F-4D97-AF65-F5344CB8AC3E}">
+        <p14:creationId xmlns:p14="http://schemas.microsoft.com/office/powerpoint/2010/main" val="704828784"/>
+      </p:ext>
+    </p:extLst>
+  </p:cSld>
+  <p:clrMapOvr>
+    <a:masterClrMapping/>
+  </p:clrMapOvr>
+</p:sld>
+</file>
+
+<file path=ppt/slides/slide14.xml><?xml version="1.0" encoding="utf-8"?>
+<p:sld xmlns:a="http://schemas.openxmlformats.org/drawingml/2006/main" xmlns:r="http://schemas.openxmlformats.org/officeDocument/2006/relationships" xmlns:p="http://schemas.openxmlformats.org/presentationml/2006/main">
+  <p:cSld>
+    <p:spTree>
+      <p:nvGrpSpPr>
+        <p:cNvPr id="1" name=""/>
+        <p:cNvGrpSpPr/>
+        <p:nvPr/>
+      </p:nvGrpSpPr>
+      <p:grpSpPr>
+        <a:xfrm>
+          <a:off x="0" y="0"/>
+          <a:ext cx="0" cy="0"/>
+          <a:chOff x="0" y="0"/>
+          <a:chExt cx="0" cy="0"/>
+        </a:xfrm>
+      </p:grpSpPr>
+      <p:sp>
+        <p:nvSpPr>
+          <p:cNvPr id="2" name="Naslov 1">
+            <a:extLst>
+              <a:ext uri="{FF2B5EF4-FFF2-40B4-BE49-F238E27FC236}">
+                <a16:creationId xmlns:a16="http://schemas.microsoft.com/office/drawing/2014/main" id="{8185A772-B4AC-486C-BB4F-BAE2B4C3AB30}"/>
+              </a:ext>
+            </a:extLst>
+          </p:cNvPr>
+          <p:cNvSpPr>
+            <a:spLocks noGrp="1"/>
+          </p:cNvSpPr>
+          <p:nvPr>
+            <p:ph type="title"/>
+          </p:nvPr>
+        </p:nvSpPr>
+        <p:spPr/>
+        <p:txBody>
+          <a:bodyPr/>
+          <a:lstStyle/>
+          <a:p>
+            <a:r>
+              <a:rPr lang="sl-SI" dirty="0"/>
+              <a:t>Iskanje najpomembnejših besed (primer)</a:t>
+            </a:r>
+          </a:p>
+        </p:txBody>
+      </p:sp>
+      <p:sp>
+        <p:nvSpPr>
+          <p:cNvPr id="3" name="Označba mesta vsebine 2">
+            <a:extLst>
+              <a:ext uri="{FF2B5EF4-FFF2-40B4-BE49-F238E27FC236}">
+                <a16:creationId xmlns:a16="http://schemas.microsoft.com/office/drawing/2014/main" id="{12151333-E0AF-46C0-AB18-EE808EB84ACC}"/>
+              </a:ext>
+            </a:extLst>
+          </p:cNvPr>
+          <p:cNvSpPr>
+            <a:spLocks noGrp="1"/>
+          </p:cNvSpPr>
+          <p:nvPr>
+            <p:ph idx="1"/>
+          </p:nvPr>
+        </p:nvSpPr>
+        <p:spPr/>
+        <p:txBody>
+          <a:bodyPr>
+            <a:normAutofit lnSpcReduction="10000"/>
+          </a:bodyPr>
+          <a:lstStyle/>
+          <a:p>
+            <a:r>
+              <a:rPr lang="sl-SI" dirty="0"/>
+              <a:t>A1: </a:t>
+            </a:r>
+            <a:r>
+              <a:rPr lang="en-US" dirty="0"/>
+              <a:t>both </a:t>
+            </a:r>
+            <a:r>
+              <a:rPr lang="sl-SI" dirty="0" err="1"/>
+              <a:t>excite</a:t>
+            </a:r>
+            <a:r>
+              <a:rPr lang="en-US" dirty="0"/>
+              <a:t> nervous</a:t>
+            </a:r>
+            <a:endParaRPr lang="sl-SI" dirty="0"/>
+          </a:p>
+          <a:p>
+            <a:r>
+              <a:rPr lang="sl-SI" dirty="0"/>
+              <a:t>A2: </a:t>
+            </a:r>
+            <a:r>
+              <a:rPr lang="sl-SI" dirty="0" err="1"/>
+              <a:t>nervous</a:t>
+            </a:r>
+            <a:r>
+              <a:rPr lang="en-US" dirty="0"/>
+              <a:t> but also </a:t>
+            </a:r>
+            <a:r>
+              <a:rPr lang="sl-SI" dirty="0" err="1"/>
+              <a:t>excite</a:t>
+            </a:r>
+            <a:r>
+              <a:rPr lang="en-US" dirty="0"/>
+              <a:t> to with mother</a:t>
+            </a:r>
+            <a:endParaRPr lang="sl-SI" dirty="0"/>
+          </a:p>
+          <a:p>
+            <a:r>
+              <a:rPr lang="sl-SI" dirty="0"/>
+              <a:t>A3: </a:t>
+            </a:r>
+            <a:r>
+              <a:rPr lang="sl-SI" dirty="0" err="1"/>
+              <a:t>excite</a:t>
+            </a:r>
+            <a:r>
+              <a:rPr lang="en-US" dirty="0"/>
+              <a:t> </a:t>
+            </a:r>
+            <a:r>
+              <a:rPr lang="sl-SI" dirty="0" err="1"/>
+              <a:t>scare</a:t>
+            </a:r>
+            <a:endParaRPr lang="sl-SI" dirty="0"/>
+          </a:p>
+          <a:p>
+            <a:endParaRPr lang="sl-SI" dirty="0"/>
+          </a:p>
+          <a:p>
+            <a:r>
+              <a:rPr lang="sl-SI" dirty="0"/>
+              <a:t>Če se beseda pojavi v več odgovorih, je pomembna</a:t>
+            </a:r>
+          </a:p>
+          <a:p>
+            <a:pPr marL="0" indent="0">
+              <a:buNone/>
+            </a:pPr>
+            <a:endParaRPr lang="sl-SI" dirty="0"/>
+          </a:p>
+          <a:p>
+            <a:r>
+              <a:rPr lang="sl-SI" dirty="0"/>
+              <a:t>Za vsak odgovor:</a:t>
+            </a:r>
+          </a:p>
+          <a:p>
+            <a:pPr lvl="1"/>
+            <a:r>
+              <a:rPr lang="sl-SI" dirty="0"/>
+              <a:t>Izračunaj povprečno podobnost z ostalimi odgovori – </a:t>
+            </a:r>
+            <a:r>
+              <a:rPr lang="sl-SI" dirty="0" err="1"/>
+              <a:t>baseline</a:t>
+            </a:r>
+            <a:endParaRPr lang="sl-SI" dirty="0"/>
+          </a:p>
+          <a:p>
+            <a:pPr lvl="1"/>
+            <a:r>
+              <a:rPr lang="sl-SI" dirty="0"/>
+              <a:t>Izmenično odstranjuj besede in primerjaj podobnost</a:t>
+            </a:r>
+          </a:p>
+          <a:p>
+            <a:pPr lvl="1"/>
+            <a:r>
+              <a:rPr lang="sl-SI" dirty="0"/>
+              <a:t>Če je podobnost manjša, je beseda pomembna</a:t>
+            </a:r>
+          </a:p>
+          <a:p>
+            <a:pPr lvl="1"/>
+            <a:endParaRPr lang="sl-SI" dirty="0"/>
+          </a:p>
+          <a:p>
+            <a:pPr marL="0" indent="0">
+              <a:buNone/>
+            </a:pPr>
+            <a:endParaRPr lang="sl-SI" dirty="0"/>
+          </a:p>
+          <a:p>
+            <a:pPr marL="0" indent="0">
+              <a:buNone/>
+            </a:pPr>
+            <a:endParaRPr lang="sl-SI" dirty="0"/>
+          </a:p>
+          <a:p>
+            <a:endParaRPr lang="sl-SI" dirty="0"/>
+          </a:p>
+        </p:txBody>
+      </p:sp>
+    </p:spTree>
+    <p:extLst>
+      <p:ext uri="{BB962C8B-B14F-4D97-AF65-F5344CB8AC3E}">
+        <p14:creationId xmlns:p14="http://schemas.microsoft.com/office/powerpoint/2010/main" val="1807974183"/>
+      </p:ext>
+    </p:extLst>
+  </p:cSld>
+  <p:clrMapOvr>
+    <a:masterClrMapping/>
+  </p:clrMapOvr>
+</p:sld>
+</file>
+
+<file path=ppt/slides/slide15.xml><?xml version="1.0" encoding="utf-8"?>
+<p:sld xmlns:a="http://schemas.openxmlformats.org/drawingml/2006/main" xmlns:r="http://schemas.openxmlformats.org/officeDocument/2006/relationships" xmlns:p="http://schemas.openxmlformats.org/presentationml/2006/main">
+  <p:cSld>
+    <p:spTree>
+      <p:nvGrpSpPr>
+        <p:cNvPr id="1" name=""/>
+        <p:cNvGrpSpPr/>
+        <p:nvPr/>
+      </p:nvGrpSpPr>
+      <p:grpSpPr>
+        <a:xfrm>
+          <a:off x="0" y="0"/>
+          <a:ext cx="0" cy="0"/>
+          <a:chOff x="0" y="0"/>
+          <a:chExt cx="0" cy="0"/>
+        </a:xfrm>
+      </p:grpSpPr>
+      <p:sp>
+        <p:nvSpPr>
+          <p:cNvPr id="2" name="Naslov 1">
+            <a:extLst>
+              <a:ext uri="{FF2B5EF4-FFF2-40B4-BE49-F238E27FC236}">
+                <a16:creationId xmlns:a16="http://schemas.microsoft.com/office/drawing/2014/main" id="{8185A772-B4AC-486C-BB4F-BAE2B4C3AB30}"/>
+              </a:ext>
+            </a:extLst>
+          </p:cNvPr>
+          <p:cNvSpPr>
+            <a:spLocks noGrp="1"/>
+          </p:cNvSpPr>
+          <p:nvPr>
+            <p:ph type="title"/>
+          </p:nvPr>
+        </p:nvSpPr>
+        <p:spPr/>
+        <p:txBody>
+          <a:bodyPr/>
+          <a:lstStyle/>
+          <a:p>
+            <a:r>
+              <a:rPr lang="sl-SI" dirty="0"/>
+              <a:t>Iskanje najpomembnejših besed (primer)</a:t>
+            </a:r>
+          </a:p>
+        </p:txBody>
+      </p:sp>
+      <p:sp>
+        <p:nvSpPr>
+          <p:cNvPr id="3" name="Označba mesta vsebine 2">
+            <a:extLst>
+              <a:ext uri="{FF2B5EF4-FFF2-40B4-BE49-F238E27FC236}">
+                <a16:creationId xmlns:a16="http://schemas.microsoft.com/office/drawing/2014/main" id="{12151333-E0AF-46C0-AB18-EE808EB84ACC}"/>
+              </a:ext>
+            </a:extLst>
+          </p:cNvPr>
+          <p:cNvSpPr>
+            <a:spLocks noGrp="1"/>
+          </p:cNvSpPr>
+          <p:nvPr>
+            <p:ph idx="1"/>
+          </p:nvPr>
+        </p:nvSpPr>
+        <p:spPr/>
+        <p:txBody>
+          <a:bodyPr>
+            <a:normAutofit lnSpcReduction="10000"/>
+          </a:bodyPr>
+          <a:lstStyle/>
+          <a:p>
+            <a:r>
+              <a:rPr lang="sl-SI" dirty="0"/>
+              <a:t>A1: </a:t>
+            </a:r>
+            <a:r>
+              <a:rPr lang="en-US" dirty="0"/>
+              <a:t>both </a:t>
+            </a:r>
+            <a:r>
+              <a:rPr lang="sl-SI" dirty="0" err="1">
+                <a:solidFill>
+                  <a:srgbClr val="FF0000"/>
+                </a:solidFill>
+              </a:rPr>
+              <a:t>excite</a:t>
+            </a:r>
+            <a:r>
+              <a:rPr lang="en-US" dirty="0"/>
+              <a:t> </a:t>
+            </a:r>
+            <a:r>
+              <a:rPr lang="en-US" dirty="0">
+                <a:solidFill>
+                  <a:srgbClr val="00B0F0"/>
+                </a:solidFill>
+              </a:rPr>
+              <a:t>nervous</a:t>
+            </a:r>
+            <a:endParaRPr lang="sl-SI" dirty="0">
+              <a:solidFill>
+                <a:srgbClr val="00B0F0"/>
+              </a:solidFill>
+            </a:endParaRPr>
+          </a:p>
+          <a:p>
+            <a:r>
+              <a:rPr lang="sl-SI" dirty="0"/>
+              <a:t>A2: </a:t>
+            </a:r>
+            <a:r>
+              <a:rPr lang="sl-SI" dirty="0" err="1">
+                <a:solidFill>
+                  <a:srgbClr val="00B0F0"/>
+                </a:solidFill>
+              </a:rPr>
+              <a:t>nervous</a:t>
+            </a:r>
+            <a:r>
+              <a:rPr lang="en-US" dirty="0"/>
+              <a:t> but also </a:t>
+            </a:r>
+            <a:r>
+              <a:rPr lang="sl-SI" dirty="0" err="1">
+                <a:solidFill>
+                  <a:srgbClr val="FF0000"/>
+                </a:solidFill>
+              </a:rPr>
+              <a:t>excite</a:t>
+            </a:r>
+            <a:r>
+              <a:rPr lang="en-US" dirty="0"/>
+              <a:t> to with mother</a:t>
+            </a:r>
+            <a:endParaRPr lang="sl-SI" dirty="0"/>
+          </a:p>
+          <a:p>
+            <a:r>
+              <a:rPr lang="sl-SI" dirty="0"/>
+              <a:t>A3: </a:t>
+            </a:r>
+            <a:r>
+              <a:rPr lang="sl-SI" dirty="0" err="1">
+                <a:solidFill>
+                  <a:srgbClr val="FF0000"/>
+                </a:solidFill>
+              </a:rPr>
+              <a:t>excite</a:t>
+            </a:r>
+            <a:r>
+              <a:rPr lang="en-US" dirty="0"/>
+              <a:t> </a:t>
+            </a:r>
+            <a:r>
+              <a:rPr lang="sl-SI" dirty="0" err="1"/>
+              <a:t>scare</a:t>
+            </a:r>
+            <a:endParaRPr lang="sl-SI" dirty="0"/>
+          </a:p>
+          <a:p>
+            <a:endParaRPr lang="sl-SI" dirty="0"/>
+          </a:p>
+          <a:p>
+            <a:r>
+              <a:rPr lang="sl-SI" dirty="0"/>
+              <a:t>Če se beseda pojavi v več odgovorih, je pomembna</a:t>
+            </a:r>
+          </a:p>
+          <a:p>
+            <a:pPr marL="0" indent="0">
+              <a:buNone/>
+            </a:pPr>
+            <a:endParaRPr lang="sl-SI" dirty="0"/>
+          </a:p>
+          <a:p>
+            <a:r>
+              <a:rPr lang="sl-SI" dirty="0"/>
+              <a:t>Za vsak odgovor:</a:t>
+            </a:r>
+          </a:p>
+          <a:p>
+            <a:pPr lvl="1"/>
+            <a:r>
+              <a:rPr lang="sl-SI" dirty="0"/>
+              <a:t>Izračunaj povprečno podobnost z ostalimi odgovori – </a:t>
+            </a:r>
+            <a:r>
+              <a:rPr lang="sl-SI" dirty="0" err="1"/>
+              <a:t>baseline</a:t>
+            </a:r>
+            <a:endParaRPr lang="sl-SI" dirty="0"/>
+          </a:p>
+          <a:p>
+            <a:pPr lvl="1"/>
+            <a:r>
+              <a:rPr lang="sl-SI" dirty="0"/>
+              <a:t>Izmenično odstranjuj besede in primerjaj podobnost</a:t>
+            </a:r>
+          </a:p>
+          <a:p>
+            <a:pPr lvl="1"/>
+            <a:r>
+              <a:rPr lang="sl-SI" dirty="0"/>
+              <a:t>Če je podobnost manjša, je beseda pomembna</a:t>
+            </a:r>
+          </a:p>
+          <a:p>
+            <a:pPr lvl="1"/>
+            <a:endParaRPr lang="sl-SI" dirty="0"/>
+          </a:p>
+          <a:p>
+            <a:pPr marL="0" indent="0">
+              <a:buNone/>
+            </a:pPr>
+            <a:endParaRPr lang="sl-SI" dirty="0"/>
+          </a:p>
+          <a:p>
+            <a:pPr marL="0" indent="0">
+              <a:buNone/>
+            </a:pPr>
+            <a:endParaRPr lang="sl-SI" dirty="0"/>
+          </a:p>
+          <a:p>
+            <a:endParaRPr lang="sl-SI" dirty="0"/>
+          </a:p>
+        </p:txBody>
+      </p:sp>
+    </p:spTree>
+    <p:extLst>
+      <p:ext uri="{BB962C8B-B14F-4D97-AF65-F5344CB8AC3E}">
+        <p14:creationId xmlns:p14="http://schemas.microsoft.com/office/powerpoint/2010/main" val="1241269214"/>
+      </p:ext>
+    </p:extLst>
+  </p:cSld>
+  <p:clrMapOvr>
+    <a:masterClrMapping/>
+  </p:clrMapOvr>
+</p:sld>
+</file>
+
+<file path=ppt/slides/slide16.xml><?xml version="1.0" encoding="utf-8"?>
+<p:sld xmlns:a="http://schemas.openxmlformats.org/drawingml/2006/main" xmlns:r="http://schemas.openxmlformats.org/officeDocument/2006/relationships" xmlns:p="http://schemas.openxmlformats.org/presentationml/2006/main">
+  <p:cSld>
+    <p:spTree>
+      <p:nvGrpSpPr>
+        <p:cNvPr id="1" name=""/>
+        <p:cNvGrpSpPr/>
+        <p:nvPr/>
+      </p:nvGrpSpPr>
+      <p:grpSpPr>
+        <a:xfrm>
+          <a:off x="0" y="0"/>
+          <a:ext cx="0" cy="0"/>
+          <a:chOff x="0" y="0"/>
+          <a:chExt cx="0" cy="0"/>
+        </a:xfrm>
+      </p:grpSpPr>
+      <p:sp>
+        <p:nvSpPr>
+          <p:cNvPr id="2" name="Naslov 1">
+            <a:extLst>
+              <a:ext uri="{FF2B5EF4-FFF2-40B4-BE49-F238E27FC236}">
+                <a16:creationId xmlns:a16="http://schemas.microsoft.com/office/drawing/2014/main" id="{8185A772-B4AC-486C-BB4F-BAE2B4C3AB30}"/>
+              </a:ext>
+            </a:extLst>
+          </p:cNvPr>
+          <p:cNvSpPr>
+            <a:spLocks noGrp="1"/>
+          </p:cNvSpPr>
+          <p:nvPr>
+            <p:ph type="title"/>
+          </p:nvPr>
+        </p:nvSpPr>
+        <p:spPr/>
+        <p:txBody>
+          <a:bodyPr/>
+          <a:lstStyle/>
+          <a:p>
+            <a:r>
+              <a:rPr lang="sl-SI" dirty="0"/>
+              <a:t>Iskanje najpomembnejših besed (primer)</a:t>
+            </a:r>
+          </a:p>
+        </p:txBody>
+      </p:sp>
+      <p:sp>
+        <p:nvSpPr>
+          <p:cNvPr id="3" name="Označba mesta vsebine 2">
+            <a:extLst>
+              <a:ext uri="{FF2B5EF4-FFF2-40B4-BE49-F238E27FC236}">
+                <a16:creationId xmlns:a16="http://schemas.microsoft.com/office/drawing/2014/main" id="{12151333-E0AF-46C0-AB18-EE808EB84ACC}"/>
+              </a:ext>
+            </a:extLst>
+          </p:cNvPr>
+          <p:cNvSpPr>
+            <a:spLocks noGrp="1"/>
+          </p:cNvSpPr>
+          <p:nvPr>
+            <p:ph idx="1"/>
+          </p:nvPr>
+        </p:nvSpPr>
+        <p:spPr/>
+        <p:txBody>
           <a:bodyPr>
             <a:normAutofit/>
           </a:bodyPr>
@@ -6526,6 +7836,158 @@
     <p:extLst>
       <p:ext uri="{BB962C8B-B14F-4D97-AF65-F5344CB8AC3E}">
         <p14:creationId xmlns:p14="http://schemas.microsoft.com/office/powerpoint/2010/main" val="1654616983"/>
+      </p:ext>
+    </p:extLst>
+  </p:cSld>
+  <p:clrMapOvr>
+    <a:masterClrMapping/>
+  </p:clrMapOvr>
+</p:sld>
+</file>
+
+<file path=ppt/slides/slide17.xml><?xml version="1.0" encoding="utf-8"?>
+<p:sld xmlns:a="http://schemas.openxmlformats.org/drawingml/2006/main" xmlns:r="http://schemas.openxmlformats.org/officeDocument/2006/relationships" xmlns:p="http://schemas.openxmlformats.org/presentationml/2006/main">
+  <p:cSld>
+    <p:spTree>
+      <p:nvGrpSpPr>
+        <p:cNvPr id="1" name=""/>
+        <p:cNvGrpSpPr/>
+        <p:nvPr/>
+      </p:nvGrpSpPr>
+      <p:grpSpPr>
+        <a:xfrm>
+          <a:off x="0" y="0"/>
+          <a:ext cx="0" cy="0"/>
+          <a:chOff x="0" y="0"/>
+          <a:chExt cx="0" cy="0"/>
+        </a:xfrm>
+      </p:grpSpPr>
+      <p:sp>
+        <p:nvSpPr>
+          <p:cNvPr id="2" name="Naslov 1">
+            <a:extLst>
+              <a:ext uri="{FF2B5EF4-FFF2-40B4-BE49-F238E27FC236}">
+                <a16:creationId xmlns:a16="http://schemas.microsoft.com/office/drawing/2014/main" id="{1E2FF7A8-EBDB-4BC5-A76C-BD2FCA56C853}"/>
+              </a:ext>
+            </a:extLst>
+          </p:cNvPr>
+          <p:cNvSpPr>
+            <a:spLocks noGrp="1"/>
+          </p:cNvSpPr>
+          <p:nvPr>
+            <p:ph type="title"/>
+          </p:nvPr>
+        </p:nvSpPr>
+        <p:spPr/>
+        <p:txBody>
+          <a:bodyPr/>
+          <a:lstStyle/>
+          <a:p>
+            <a:r>
+              <a:rPr lang="sl-SI" dirty="0"/>
+              <a:t>Povzetek</a:t>
+            </a:r>
+          </a:p>
+        </p:txBody>
+      </p:sp>
+      <p:sp>
+        <p:nvSpPr>
+          <p:cNvPr id="3" name="Označba mesta vsebine 2">
+            <a:extLst>
+              <a:ext uri="{FF2B5EF4-FFF2-40B4-BE49-F238E27FC236}">
+                <a16:creationId xmlns:a16="http://schemas.microsoft.com/office/drawing/2014/main" id="{ED46FA06-DCB3-417E-A99F-1481A582AA93}"/>
+              </a:ext>
+            </a:extLst>
+          </p:cNvPr>
+          <p:cNvSpPr>
+            <a:spLocks noGrp="1"/>
+          </p:cNvSpPr>
+          <p:nvPr>
+            <p:ph idx="1"/>
+          </p:nvPr>
+        </p:nvSpPr>
+        <p:spPr/>
+        <p:txBody>
+          <a:bodyPr/>
+          <a:lstStyle/>
+          <a:p>
+            <a:r>
+              <a:rPr lang="sl-SI" dirty="0"/>
+              <a:t>Model A</a:t>
+            </a:r>
+          </a:p>
+          <a:p>
+            <a:pPr lvl="1"/>
+            <a:r>
+              <a:rPr lang="sl-SI" dirty="0" err="1"/>
+              <a:t>Mikro</a:t>
+            </a:r>
+            <a:r>
+              <a:rPr lang="sl-SI" dirty="0"/>
+              <a:t>: 65%</a:t>
+            </a:r>
+          </a:p>
+          <a:p>
+            <a:pPr lvl="1"/>
+            <a:r>
+              <a:rPr lang="sl-SI" dirty="0"/>
+              <a:t>Makro: 48%</a:t>
+            </a:r>
+          </a:p>
+          <a:p>
+            <a:r>
+              <a:rPr lang="sl-SI" dirty="0"/>
+              <a:t>Model B</a:t>
+            </a:r>
+          </a:p>
+          <a:p>
+            <a:pPr lvl="1"/>
+            <a:r>
+              <a:rPr lang="sl-SI" dirty="0" err="1"/>
+              <a:t>Mikro</a:t>
+            </a:r>
+            <a:r>
+              <a:rPr lang="sl-SI" dirty="0"/>
+              <a:t>: 72%</a:t>
+            </a:r>
+          </a:p>
+          <a:p>
+            <a:pPr lvl="1"/>
+            <a:r>
+              <a:rPr lang="sl-SI" dirty="0"/>
+              <a:t>Makro: 49%</a:t>
+            </a:r>
+          </a:p>
+          <a:p>
+            <a:r>
+              <a:rPr lang="sl-SI" dirty="0"/>
+              <a:t>Model C</a:t>
+            </a:r>
+          </a:p>
+          <a:p>
+            <a:pPr lvl="1"/>
+            <a:r>
+              <a:rPr lang="sl-SI" dirty="0" err="1"/>
+              <a:t>Mikro</a:t>
+            </a:r>
+            <a:r>
+              <a:rPr lang="sl-SI" dirty="0"/>
+              <a:t>: 71%</a:t>
+            </a:r>
+          </a:p>
+          <a:p>
+            <a:pPr lvl="1"/>
+            <a:r>
+              <a:rPr lang="sl-SI" dirty="0"/>
+              <a:t>Makro: 52%</a:t>
+            </a:r>
+          </a:p>
+        </p:txBody>
+      </p:sp>
+    </p:spTree>
+    <p:extLst>
+      <p:ext uri="{BB962C8B-B14F-4D97-AF65-F5344CB8AC3E}">
+        <p14:creationId xmlns:p14="http://schemas.microsoft.com/office/powerpoint/2010/main" val="1763833381"/>
       </p:ext>
     </p:extLst>
   </p:cSld>
@@ -6759,21 +8221,23 @@
             </a:r>
           </a:p>
           <a:p>
+            <a:pPr lvl="1"/>
+            <a:r>
+              <a:rPr lang="sl-SI" dirty="0" err="1"/>
+              <a:t>Koreferenčnost</a:t>
+            </a:r>
+            <a:r>
+              <a:rPr lang="sl-SI" dirty="0"/>
+              <a:t>?</a:t>
+            </a:r>
+          </a:p>
+          <a:p>
             <a:endParaRPr lang="sl-SI" dirty="0"/>
           </a:p>
           <a:p>
             <a:r>
               <a:rPr lang="sl-SI" dirty="0"/>
               <a:t>Povprečje obeh metod</a:t>
-            </a:r>
-          </a:p>
-          <a:p>
-            <a:endParaRPr lang="sl-SI" dirty="0"/>
-          </a:p>
-          <a:p>
-            <a:r>
-              <a:rPr lang="sl-SI" dirty="0"/>
-              <a:t>Najboljše: samo s podobnostjo</a:t>
             </a:r>
           </a:p>
         </p:txBody>
@@ -6813,7 +8277,7 @@
           <p:cNvPr id="2" name="Naslov 1">
             <a:extLst>
               <a:ext uri="{FF2B5EF4-FFF2-40B4-BE49-F238E27FC236}">
-                <a16:creationId xmlns:a16="http://schemas.microsoft.com/office/drawing/2014/main" id="{0D38AC93-03A9-4D0B-87B0-F093904FF5B7}"/>
+                <a16:creationId xmlns:a16="http://schemas.microsoft.com/office/drawing/2014/main" id="{5E520A5F-CCF7-408B-92C5-D94B552FAA87}"/>
               </a:ext>
             </a:extLst>
           </p:cNvPr>
@@ -6829,10 +8293,7 @@
           <a:bodyPr/>
           <a:lstStyle/>
           <a:p>
-            <a:r>
-              <a:rPr lang="sl-SI" dirty="0"/>
-              <a:t>Model B</a:t>
-            </a:r>
+            <a:endParaRPr lang="sl-SI"/>
           </a:p>
         </p:txBody>
       </p:sp>
@@ -6841,7 +8302,7 @@
           <p:cNvPr id="3" name="Označba mesta vsebine 2">
             <a:extLst>
               <a:ext uri="{FF2B5EF4-FFF2-40B4-BE49-F238E27FC236}">
-                <a16:creationId xmlns:a16="http://schemas.microsoft.com/office/drawing/2014/main" id="{8EECD06F-97AF-4CC2-9E51-B75ED2F0801C}"/>
+                <a16:creationId xmlns:a16="http://schemas.microsoft.com/office/drawing/2014/main" id="{CB6617DE-1332-4053-B99A-47E61E943FCC}"/>
               </a:ext>
             </a:extLst>
           </p:cNvPr>
@@ -6857,59 +8318,90 @@
           <a:bodyPr/>
           <a:lstStyle/>
           <a:p>
-            <a:r>
-              <a:rPr lang="sl-SI" dirty="0"/>
-              <a:t>Enako kot model A (le več podatkov)</a:t>
-            </a:r>
-          </a:p>
-          <a:p>
-            <a:pPr lvl="1"/>
-            <a:r>
-              <a:rPr lang="sl-SI" dirty="0"/>
-              <a:t>Kosinusna podobnost</a:t>
-            </a:r>
-          </a:p>
-          <a:p>
-            <a:pPr lvl="1"/>
-            <a:r>
-              <a:rPr lang="sl-SI" dirty="0" err="1"/>
-              <a:t>OpenIE</a:t>
-            </a:r>
-            <a:endParaRPr lang="sl-SI" dirty="0"/>
-          </a:p>
-          <a:p>
-            <a:pPr lvl="1"/>
-            <a:r>
-              <a:rPr lang="sl-SI" dirty="0"/>
-              <a:t>Povprečje obeh</a:t>
-            </a:r>
-          </a:p>
-          <a:p>
-            <a:pPr lvl="1"/>
-            <a:endParaRPr lang="sl-SI" dirty="0"/>
-          </a:p>
-          <a:p>
-            <a:r>
-              <a:rPr lang="sl-SI" dirty="0"/>
-              <a:t>Iskanje najpomembnejših besed (primer kasneje)</a:t>
-            </a:r>
-          </a:p>
-          <a:p>
-            <a:pPr lvl="1"/>
-            <a:endParaRPr lang="sl-SI" dirty="0"/>
-          </a:p>
-          <a:p>
-            <a:r>
-              <a:rPr lang="sl-SI" dirty="0"/>
-              <a:t>Najboljše: najpomembnejše besede</a:t>
-            </a:r>
+            <a:endParaRPr lang="sl-SI"/>
+          </a:p>
+        </p:txBody>
+      </p:sp>
+      <p:pic>
+        <p:nvPicPr>
+          <p:cNvPr id="4" name="Slika 3">
+            <a:extLst>
+              <a:ext uri="{FF2B5EF4-FFF2-40B4-BE49-F238E27FC236}">
+                <a16:creationId xmlns:a16="http://schemas.microsoft.com/office/drawing/2014/main" id="{6CCF5942-9B26-46FD-B32C-95CB5CA86C2F}"/>
+              </a:ext>
+            </a:extLst>
+          </p:cNvPr>
+          <p:cNvPicPr>
+            <a:picLocks noChangeAspect="1"/>
+          </p:cNvPicPr>
+          <p:nvPr/>
+        </p:nvPicPr>
+        <p:blipFill>
+          <a:blip r:embed="rId2"/>
+          <a:stretch>
+            <a:fillRect/>
+          </a:stretch>
+        </p:blipFill>
+        <p:spPr>
+          <a:xfrm>
+            <a:off x="68569" y="0"/>
+            <a:ext cx="12054861" cy="6858000"/>
+          </a:xfrm>
+          <a:prstGeom prst="rect">
+            <a:avLst/>
+          </a:prstGeom>
+        </p:spPr>
+      </p:pic>
+      <p:sp>
+        <p:nvSpPr>
+          <p:cNvPr id="5" name="Diagram poteka: odločitev 4">
+            <a:extLst>
+              <a:ext uri="{FF2B5EF4-FFF2-40B4-BE49-F238E27FC236}">
+                <a16:creationId xmlns:a16="http://schemas.microsoft.com/office/drawing/2014/main" id="{36160ED2-FE85-4433-8120-3DB81E0006D2}"/>
+              </a:ext>
+            </a:extLst>
+          </p:cNvPr>
+          <p:cNvSpPr/>
+          <p:nvPr/>
+        </p:nvSpPr>
+        <p:spPr>
+          <a:xfrm>
+            <a:off x="8167455" y="2178345"/>
+            <a:ext cx="204187" cy="236637"/>
+          </a:xfrm>
+          <a:prstGeom prst="flowChartDecision">
+            <a:avLst/>
+          </a:prstGeom>
+        </p:spPr>
+        <p:style>
+          <a:lnRef idx="2">
+            <a:schemeClr val="accent1">
+              <a:shade val="50000"/>
+            </a:schemeClr>
+          </a:lnRef>
+          <a:fillRef idx="1">
+            <a:schemeClr val="accent1"/>
+          </a:fillRef>
+          <a:effectRef idx="0">
+            <a:schemeClr val="accent1"/>
+          </a:effectRef>
+          <a:fontRef idx="minor">
+            <a:schemeClr val="lt1"/>
+          </a:fontRef>
+        </p:style>
+        <p:txBody>
+          <a:bodyPr rtlCol="0" anchor="ctr"/>
+          <a:lstStyle/>
+          <a:p>
+            <a:pPr algn="ctr"/>
+            <a:endParaRPr lang="sl-SI"/>
           </a:p>
         </p:txBody>
       </p:sp>
     </p:spTree>
     <p:extLst>
       <p:ext uri="{BB962C8B-B14F-4D97-AF65-F5344CB8AC3E}">
-        <p14:creationId xmlns:p14="http://schemas.microsoft.com/office/powerpoint/2010/main" val="944087317"/>
+        <p14:creationId xmlns:p14="http://schemas.microsoft.com/office/powerpoint/2010/main" val="1922492757"/>
       </p:ext>
     </p:extLst>
   </p:cSld>
@@ -6941,7 +8433,7 @@
           <p:cNvPr id="2" name="Naslov 1">
             <a:extLst>
               <a:ext uri="{FF2B5EF4-FFF2-40B4-BE49-F238E27FC236}">
-                <a16:creationId xmlns:a16="http://schemas.microsoft.com/office/drawing/2014/main" id="{DAEABB1E-874D-42D5-86FC-7238BC09B42F}"/>
+                <a16:creationId xmlns:a16="http://schemas.microsoft.com/office/drawing/2014/main" id="{0D38AC93-03A9-4D0B-87B0-F093904FF5B7}"/>
               </a:ext>
             </a:extLst>
           </p:cNvPr>
@@ -6959,7 +8451,7 @@
           <a:p>
             <a:r>
               <a:rPr lang="sl-SI" dirty="0"/>
-              <a:t>Model C</a:t>
+              <a:t>Model B</a:t>
             </a:r>
           </a:p>
         </p:txBody>
@@ -6969,7 +8461,7 @@
           <p:cNvPr id="3" name="Označba mesta vsebine 2">
             <a:extLst>
               <a:ext uri="{FF2B5EF4-FFF2-40B4-BE49-F238E27FC236}">
-                <a16:creationId xmlns:a16="http://schemas.microsoft.com/office/drawing/2014/main" id="{4A47628A-45BF-4E48-A9D8-1989EBA08DCE}"/>
+                <a16:creationId xmlns:a16="http://schemas.microsoft.com/office/drawing/2014/main" id="{8EECD06F-97AF-4CC2-9E51-B75ED2F0801C}"/>
               </a:ext>
             </a:extLst>
           </p:cNvPr>
@@ -6982,79 +8474,122 @@
         </p:nvSpPr>
         <p:spPr/>
         <p:txBody>
-          <a:bodyPr>
-            <a:normAutofit/>
-          </a:bodyPr>
+          <a:bodyPr/>
           <a:lstStyle/>
           <a:p>
             <a:r>
               <a:rPr lang="sl-SI" dirty="0"/>
-              <a:t>Tri rešitve</a:t>
-            </a:r>
-          </a:p>
-          <a:p>
-            <a:endParaRPr lang="sl-SI" dirty="0"/>
-          </a:p>
-          <a:p>
+              <a:t>Enako kot model A (le več podatkov)</a:t>
+            </a:r>
+          </a:p>
+          <a:p>
+            <a:pPr lvl="1"/>
             <a:r>
               <a:rPr lang="sl-SI" dirty="0"/>
-              <a:t>1. Kosinusna podobnost + </a:t>
-            </a:r>
+              <a:t>Kosinusna podobnost</a:t>
+            </a:r>
+          </a:p>
+          <a:p>
+            <a:pPr lvl="1"/>
             <a:r>
               <a:rPr lang="sl-SI" dirty="0" err="1"/>
               <a:t>OpenIE</a:t>
             </a:r>
+            <a:endParaRPr lang="sl-SI" dirty="0"/>
+          </a:p>
+          <a:p>
+            <a:pPr lvl="1"/>
             <a:r>
               <a:rPr lang="sl-SI" dirty="0"/>
-              <a:t> z dodanimi sinonimi (</a:t>
-            </a:r>
-            <a:r>
-              <a:rPr lang="sl-SI" dirty="0" err="1"/>
-              <a:t>WordNet</a:t>
-            </a:r>
-            <a:r>
-              <a:rPr lang="sl-SI" dirty="0"/>
-              <a:t>)</a:t>
-            </a:r>
-          </a:p>
-          <a:p>
+              <a:t>Povprečje obeh</a:t>
+            </a:r>
+          </a:p>
+          <a:p>
+            <a:pPr lvl="1"/>
             <a:endParaRPr lang="sl-SI" dirty="0"/>
           </a:p>
-          <a:p>
-            <a:r>
-              <a:rPr lang="sl-SI" dirty="0"/>
-              <a:t>2. Podobnost glede na razdaljo besed v </a:t>
-            </a:r>
-            <a:r>
-              <a:rPr lang="sl-SI" dirty="0" err="1"/>
-              <a:t>WordNetu</a:t>
-            </a:r>
-            <a:endParaRPr lang="sl-SI" dirty="0"/>
-          </a:p>
-          <a:p>
-            <a:endParaRPr lang="sl-SI" dirty="0"/>
-          </a:p>
-          <a:p>
-            <a:r>
-              <a:rPr lang="sl-SI" dirty="0"/>
-              <a:t>3. Pomembnost besed z dodanimi sinonimi</a:t>
-            </a:r>
-          </a:p>
-          <a:p>
-            <a:endParaRPr lang="sl-SI" dirty="0"/>
-          </a:p>
-          <a:p>
-            <a:r>
-              <a:rPr lang="sl-SI" dirty="0"/>
-              <a:t>Najbolje: 2.</a:t>
-            </a:r>
+        </p:txBody>
+      </p:sp>
+      <p:pic>
+        <p:nvPicPr>
+          <p:cNvPr id="4" name="Slika 3">
+            <a:extLst>
+              <a:ext uri="{FF2B5EF4-FFF2-40B4-BE49-F238E27FC236}">
+                <a16:creationId xmlns:a16="http://schemas.microsoft.com/office/drawing/2014/main" id="{62E88FCE-7C3D-4BC8-800F-92931A4405C0}"/>
+              </a:ext>
+            </a:extLst>
+          </p:cNvPr>
+          <p:cNvPicPr>
+            <a:picLocks noChangeAspect="1"/>
+          </p:cNvPicPr>
+          <p:nvPr/>
+        </p:nvPicPr>
+        <p:blipFill>
+          <a:blip r:embed="rId2"/>
+          <a:stretch>
+            <a:fillRect/>
+          </a:stretch>
+        </p:blipFill>
+        <p:spPr>
+          <a:xfrm>
+            <a:off x="4115480" y="2739413"/>
+            <a:ext cx="8076520" cy="4118587"/>
+          </a:xfrm>
+          <a:prstGeom prst="rect">
+            <a:avLst/>
+          </a:prstGeom>
+        </p:spPr>
+      </p:pic>
+      <p:sp>
+        <p:nvSpPr>
+          <p:cNvPr id="5" name="Diagram poteka: odločitev 4">
+            <a:extLst>
+              <a:ext uri="{FF2B5EF4-FFF2-40B4-BE49-F238E27FC236}">
+                <a16:creationId xmlns:a16="http://schemas.microsoft.com/office/drawing/2014/main" id="{176ADAAC-2C55-49C9-8BEB-536F5DDCA417}"/>
+              </a:ext>
+            </a:extLst>
+          </p:cNvPr>
+          <p:cNvSpPr/>
+          <p:nvPr/>
+        </p:nvSpPr>
+        <p:spPr>
+          <a:xfrm>
+            <a:off x="9069816" y="4083220"/>
+            <a:ext cx="176626" cy="204696"/>
+          </a:xfrm>
+          <a:prstGeom prst="flowChartDecision">
+            <a:avLst/>
+          </a:prstGeom>
+        </p:spPr>
+        <p:style>
+          <a:lnRef idx="2">
+            <a:schemeClr val="accent1">
+              <a:shade val="50000"/>
+            </a:schemeClr>
+          </a:lnRef>
+          <a:fillRef idx="1">
+            <a:schemeClr val="accent1"/>
+          </a:fillRef>
+          <a:effectRef idx="0">
+            <a:schemeClr val="accent1"/>
+          </a:effectRef>
+          <a:fontRef idx="minor">
+            <a:schemeClr val="lt1"/>
+          </a:fontRef>
+        </p:style>
+        <p:txBody>
+          <a:bodyPr rtlCol="0" anchor="ctr"/>
+          <a:lstStyle/>
+          <a:p>
+            <a:pPr algn="ctr"/>
+            <a:endParaRPr lang="sl-SI"/>
           </a:p>
         </p:txBody>
       </p:sp>
     </p:spTree>
     <p:extLst>
       <p:ext uri="{BB962C8B-B14F-4D97-AF65-F5344CB8AC3E}">
-        <p14:creationId xmlns:p14="http://schemas.microsoft.com/office/powerpoint/2010/main" val="4053697508"/>
+        <p14:creationId xmlns:p14="http://schemas.microsoft.com/office/powerpoint/2010/main" val="944087317"/>
       </p:ext>
     </p:extLst>
   </p:cSld>
@@ -7086,7 +8621,7 @@
           <p:cNvPr id="2" name="Naslov 1">
             <a:extLst>
               <a:ext uri="{FF2B5EF4-FFF2-40B4-BE49-F238E27FC236}">
-                <a16:creationId xmlns:a16="http://schemas.microsoft.com/office/drawing/2014/main" id="{8185A772-B4AC-486C-BB4F-BAE2B4C3AB30}"/>
+                <a16:creationId xmlns:a16="http://schemas.microsoft.com/office/drawing/2014/main" id="{DAEABB1E-874D-42D5-86FC-7238BC09B42F}"/>
               </a:ext>
             </a:extLst>
           </p:cNvPr>
@@ -7104,7 +8639,7 @@
           <a:p>
             <a:r>
               <a:rPr lang="sl-SI" dirty="0"/>
-              <a:t>Iskanje najpomembnejših besed (primer)</a:t>
+              <a:t>Model C</a:t>
             </a:r>
           </a:p>
         </p:txBody>
@@ -7114,7 +8649,7 @@
           <p:cNvPr id="3" name="Označba mesta vsebine 2">
             <a:extLst>
               <a:ext uri="{FF2B5EF4-FFF2-40B4-BE49-F238E27FC236}">
-                <a16:creationId xmlns:a16="http://schemas.microsoft.com/office/drawing/2014/main" id="{12151333-E0AF-46C0-AB18-EE808EB84ACC}"/>
+                <a16:creationId xmlns:a16="http://schemas.microsoft.com/office/drawing/2014/main" id="{4A47628A-45BF-4E48-A9D8-1989EBA08DCE}"/>
               </a:ext>
             </a:extLst>
           </p:cNvPr>
@@ -7127,78 +8662,53 @@
         </p:nvSpPr>
         <p:spPr/>
         <p:txBody>
-          <a:bodyPr/>
+          <a:bodyPr>
+            <a:normAutofit/>
+          </a:bodyPr>
           <a:lstStyle/>
           <a:p>
             <a:r>
               <a:rPr lang="sl-SI" dirty="0"/>
-              <a:t>Q: </a:t>
-            </a:r>
-            <a:r>
-              <a:rPr lang="en-US" dirty="0"/>
-              <a:t>How does </a:t>
-            </a:r>
-            <a:r>
-              <a:rPr lang="en-US" dirty="0" err="1"/>
-              <a:t>Shiranna</a:t>
-            </a:r>
-            <a:r>
-              <a:rPr lang="en-US" dirty="0"/>
-              <a:t> feel as the shuttle is taking off?</a:t>
-            </a:r>
+              <a:t>Tri rešitve</a:t>
+            </a:r>
+          </a:p>
+          <a:p>
             <a:endParaRPr lang="sl-SI" dirty="0"/>
           </a:p>
           <a:p>
+            <a:r>
+              <a:rPr lang="sl-SI" dirty="0"/>
+              <a:t>1. Podobnost glede na razdaljo besed v </a:t>
+            </a:r>
+            <a:r>
+              <a:rPr lang="sl-SI" dirty="0" err="1"/>
+              <a:t>WordNetu</a:t>
+            </a:r>
             <a:endParaRPr lang="sl-SI" dirty="0"/>
           </a:p>
           <a:p>
+            <a:endParaRPr lang="sl-SI" dirty="0"/>
+          </a:p>
+          <a:p>
             <a:r>
               <a:rPr lang="sl-SI" dirty="0"/>
-              <a:t>A1: </a:t>
-            </a:r>
-            <a:r>
-              <a:rPr lang="en-US" dirty="0" err="1"/>
-              <a:t>Shiranna</a:t>
-            </a:r>
-            <a:r>
-              <a:rPr lang="en-US" dirty="0"/>
-              <a:t> feels both excited and nervous as the shuttle is taking off.</a:t>
-            </a:r>
-            <a:endParaRPr lang="sl-SI" dirty="0"/>
-          </a:p>
-          <a:p>
+              <a:t>2. Kosinusna podobnost + </a:t>
+            </a:r>
+            <a:r>
+              <a:rPr lang="sl-SI" dirty="0" err="1"/>
+              <a:t>OpenIE</a:t>
+            </a:r>
             <a:r>
               <a:rPr lang="sl-SI" dirty="0"/>
-              <a:t>A2: </a:t>
-            </a:r>
-            <a:r>
-              <a:rPr lang="en-US" dirty="0"/>
-              <a:t>Nervous, but also excited to be with her mother.</a:t>
-            </a:r>
-            <a:endParaRPr lang="sl-SI" dirty="0"/>
-          </a:p>
-          <a:p>
+              <a:t> z dodanimi sinonimi (</a:t>
+            </a:r>
+            <a:r>
+              <a:rPr lang="sl-SI" dirty="0" err="1"/>
+              <a:t>WordNet</a:t>
+            </a:r>
             <a:r>
               <a:rPr lang="sl-SI" dirty="0"/>
-              <a:t>A3: </a:t>
-            </a:r>
-            <a:r>
-              <a:rPr lang="en-US" dirty="0"/>
-              <a:t>she is excited and scared</a:t>
-            </a:r>
-            <a:endParaRPr lang="sl-SI" dirty="0"/>
-          </a:p>
-          <a:p>
-            <a:endParaRPr lang="sl-SI" dirty="0"/>
-          </a:p>
-          <a:p>
-            <a:r>
-              <a:rPr lang="sl-SI" dirty="0" err="1"/>
-              <a:t>Predprocesiranje</a:t>
-            </a:r>
-            <a:r>
-              <a:rPr lang="sl-SI" dirty="0"/>
-              <a:t> + odstranimo besede, ki se pojavijo v vprašanju</a:t>
+              <a:t>)</a:t>
             </a:r>
           </a:p>
           <a:p>
@@ -7206,13 +8716,19 @@
               <a:buNone/>
             </a:pPr>
             <a:endParaRPr lang="sl-SI" dirty="0"/>
+          </a:p>
+          <a:p>
+            <a:r>
+              <a:rPr lang="sl-SI" dirty="0"/>
+              <a:t>3. Pomembnost besed z dodanimi sinonimi</a:t>
+            </a:r>
           </a:p>
         </p:txBody>
       </p:sp>
     </p:spTree>
     <p:extLst>
       <p:ext uri="{BB962C8B-B14F-4D97-AF65-F5344CB8AC3E}">
-        <p14:creationId xmlns:p14="http://schemas.microsoft.com/office/powerpoint/2010/main" val="1235242580"/>
+        <p14:creationId xmlns:p14="http://schemas.microsoft.com/office/powerpoint/2010/main" val="4053697508"/>
       </p:ext>
     </p:extLst>
   </p:cSld>
@@ -7244,7 +8760,7 @@
           <p:cNvPr id="2" name="Naslov 1">
             <a:extLst>
               <a:ext uri="{FF2B5EF4-FFF2-40B4-BE49-F238E27FC236}">
-                <a16:creationId xmlns:a16="http://schemas.microsoft.com/office/drawing/2014/main" id="{8185A772-B4AC-486C-BB4F-BAE2B4C3AB30}"/>
+                <a16:creationId xmlns:a16="http://schemas.microsoft.com/office/drawing/2014/main" id="{A91D698C-DBC5-446A-BC8F-6459C178D91E}"/>
               </a:ext>
             </a:extLst>
           </p:cNvPr>
@@ -7262,250 +8778,47 @@
           <a:p>
             <a:r>
               <a:rPr lang="sl-SI" dirty="0"/>
-              <a:t>Iskanje najpomembnejših besed (primer)</a:t>
-            </a:r>
-          </a:p>
-        </p:txBody>
-      </p:sp>
-      <p:sp>
-        <p:nvSpPr>
-          <p:cNvPr id="3" name="Označba mesta vsebine 2">
+              <a:t>Model C1</a:t>
+            </a:r>
+          </a:p>
+        </p:txBody>
+      </p:sp>
+      <p:pic>
+        <p:nvPicPr>
+          <p:cNvPr id="4" name="Označba mesta vsebine 3">
             <a:extLst>
               <a:ext uri="{FF2B5EF4-FFF2-40B4-BE49-F238E27FC236}">
-                <a16:creationId xmlns:a16="http://schemas.microsoft.com/office/drawing/2014/main" id="{12151333-E0AF-46C0-AB18-EE808EB84ACC}"/>
+                <a16:creationId xmlns:a16="http://schemas.microsoft.com/office/drawing/2014/main" id="{F0197F4C-436D-493C-B392-139598333C22}"/>
               </a:ext>
             </a:extLst>
           </p:cNvPr>
-          <p:cNvSpPr>
-            <a:spLocks noGrp="1"/>
-          </p:cNvSpPr>
+          <p:cNvPicPr>
+            <a:picLocks noGrp="1" noChangeAspect="1"/>
+          </p:cNvPicPr>
           <p:nvPr>
             <p:ph idx="1"/>
           </p:nvPr>
-        </p:nvSpPr>
-        <p:spPr/>
-        <p:txBody>
-          <a:bodyPr/>
-          <a:lstStyle/>
-          <a:p>
-            <a:r>
-              <a:rPr lang="sl-SI" dirty="0"/>
-              <a:t>Q: </a:t>
-            </a:r>
-            <a:r>
-              <a:rPr lang="en-US" dirty="0"/>
-              <a:t>How does </a:t>
-            </a:r>
-            <a:r>
-              <a:rPr lang="en-US" dirty="0" err="1">
-                <a:solidFill>
-                  <a:srgbClr val="FF0000"/>
-                </a:solidFill>
-              </a:rPr>
-              <a:t>Shiranna</a:t>
-            </a:r>
-            <a:r>
-              <a:rPr lang="en-US" dirty="0"/>
-              <a:t> </a:t>
-            </a:r>
-            <a:r>
-              <a:rPr lang="en-US" dirty="0">
-                <a:solidFill>
-                  <a:schemeClr val="accent6">
-                    <a:lumMod val="75000"/>
-                  </a:schemeClr>
-                </a:solidFill>
-              </a:rPr>
-              <a:t>feel</a:t>
-            </a:r>
-            <a:r>
-              <a:rPr lang="en-US" dirty="0"/>
-              <a:t> </a:t>
-            </a:r>
-            <a:r>
-              <a:rPr lang="en-US" dirty="0">
-                <a:solidFill>
-                  <a:srgbClr val="00B0F0"/>
-                </a:solidFill>
-              </a:rPr>
-              <a:t>as the shuttle</a:t>
-            </a:r>
-            <a:r>
-              <a:rPr lang="en-US" dirty="0"/>
-              <a:t> </a:t>
-            </a:r>
-            <a:r>
-              <a:rPr lang="en-US" dirty="0">
-                <a:solidFill>
-                  <a:srgbClr val="FFC000"/>
-                </a:solidFill>
-              </a:rPr>
-              <a:t>is</a:t>
-            </a:r>
-            <a:r>
-              <a:rPr lang="en-US" dirty="0"/>
-              <a:t> </a:t>
-            </a:r>
-            <a:r>
-              <a:rPr lang="en-US" dirty="0">
-                <a:solidFill>
-                  <a:srgbClr val="00B0F0"/>
-                </a:solidFill>
-              </a:rPr>
-              <a:t>taking</a:t>
-            </a:r>
-            <a:r>
-              <a:rPr lang="en-US" dirty="0"/>
-              <a:t> </a:t>
-            </a:r>
-            <a:r>
-              <a:rPr lang="en-US" dirty="0">
-                <a:solidFill>
-                  <a:srgbClr val="00B0F0"/>
-                </a:solidFill>
-              </a:rPr>
-              <a:t>off</a:t>
-            </a:r>
-            <a:r>
-              <a:rPr lang="en-US" dirty="0"/>
-              <a:t>?</a:t>
-            </a:r>
-            <a:endParaRPr lang="sl-SI" dirty="0"/>
-          </a:p>
-          <a:p>
-            <a:endParaRPr lang="sl-SI" dirty="0"/>
-          </a:p>
-          <a:p>
-            <a:r>
-              <a:rPr lang="sl-SI" dirty="0"/>
-              <a:t>A1: </a:t>
-            </a:r>
-            <a:r>
-              <a:rPr lang="en-US" dirty="0" err="1">
-                <a:solidFill>
-                  <a:srgbClr val="FF0000"/>
-                </a:solidFill>
-              </a:rPr>
-              <a:t>Shiranna</a:t>
-            </a:r>
-            <a:r>
-              <a:rPr lang="en-US" dirty="0"/>
-              <a:t> </a:t>
-            </a:r>
-            <a:r>
-              <a:rPr lang="en-US" dirty="0">
-                <a:solidFill>
-                  <a:schemeClr val="accent6">
-                    <a:lumMod val="75000"/>
-                  </a:schemeClr>
-                </a:solidFill>
-              </a:rPr>
-              <a:t>feels</a:t>
-            </a:r>
-            <a:r>
-              <a:rPr lang="en-US" dirty="0"/>
-              <a:t> both excited and nervous </a:t>
-            </a:r>
-            <a:r>
-              <a:rPr lang="en-US" dirty="0">
-                <a:solidFill>
-                  <a:srgbClr val="00B0F0"/>
-                </a:solidFill>
-              </a:rPr>
-              <a:t>as the shuttle </a:t>
-            </a:r>
-            <a:r>
-              <a:rPr lang="en-US" dirty="0">
-                <a:solidFill>
-                  <a:schemeClr val="accent3">
-                    <a:lumMod val="60000"/>
-                    <a:lumOff val="40000"/>
-                  </a:schemeClr>
-                </a:solidFill>
-              </a:rPr>
-              <a:t>is</a:t>
-            </a:r>
-            <a:r>
-              <a:rPr lang="en-US" dirty="0">
-                <a:solidFill>
-                  <a:srgbClr val="00B0F0"/>
-                </a:solidFill>
-              </a:rPr>
-              <a:t> taking off</a:t>
-            </a:r>
-            <a:r>
-              <a:rPr lang="en-US" dirty="0"/>
-              <a:t>.</a:t>
-            </a:r>
-            <a:endParaRPr lang="sl-SI" dirty="0"/>
-          </a:p>
-          <a:p>
-            <a:r>
-              <a:rPr lang="sl-SI" dirty="0"/>
-              <a:t>A2: </a:t>
-            </a:r>
-            <a:r>
-              <a:rPr lang="en-US" dirty="0"/>
-              <a:t>Nervous, but also excited to </a:t>
-            </a:r>
-            <a:r>
-              <a:rPr lang="en-US" dirty="0">
-                <a:solidFill>
-                  <a:srgbClr val="FFC000"/>
-                </a:solidFill>
-              </a:rPr>
-              <a:t>be</a:t>
-            </a:r>
-            <a:r>
-              <a:rPr lang="en-US" dirty="0"/>
-              <a:t> with her mother.</a:t>
-            </a:r>
-            <a:endParaRPr lang="sl-SI" dirty="0"/>
-          </a:p>
-          <a:p>
-            <a:r>
-              <a:rPr lang="sl-SI" dirty="0"/>
-              <a:t>A3: </a:t>
-            </a:r>
-            <a:r>
-              <a:rPr lang="en-US" dirty="0"/>
-              <a:t>she </a:t>
-            </a:r>
-            <a:r>
-              <a:rPr lang="en-US" dirty="0">
-                <a:solidFill>
-                  <a:schemeClr val="accent4">
-                    <a:lumMod val="60000"/>
-                    <a:lumOff val="40000"/>
-                  </a:schemeClr>
-                </a:solidFill>
-              </a:rPr>
-              <a:t>is</a:t>
-            </a:r>
-            <a:r>
-              <a:rPr lang="en-US" dirty="0"/>
-              <a:t> excited and scared</a:t>
-            </a:r>
-            <a:endParaRPr lang="sl-SI" dirty="0"/>
-          </a:p>
-          <a:p>
-            <a:pPr marL="0" indent="0">
-              <a:buNone/>
-            </a:pPr>
-            <a:endParaRPr lang="sl-SI" dirty="0"/>
-          </a:p>
-          <a:p>
-            <a:endParaRPr lang="sl-SI" dirty="0"/>
-          </a:p>
-          <a:p>
-            <a:endParaRPr lang="sl-SI" dirty="0"/>
-          </a:p>
-        </p:txBody>
-      </p:sp>
+        </p:nvPicPr>
+        <p:blipFill>
+          <a:blip r:embed="rId2"/>
+          <a:stretch>
+            <a:fillRect/>
+          </a:stretch>
+        </p:blipFill>
+        <p:spPr>
+          <a:xfrm>
+            <a:off x="677334" y="1795238"/>
+            <a:ext cx="5005544" cy="1411820"/>
+          </a:xfrm>
+          <a:prstGeom prst="rect">
+            <a:avLst/>
+          </a:prstGeom>
+        </p:spPr>
+      </p:pic>
     </p:spTree>
     <p:extLst>
       <p:ext uri="{BB962C8B-B14F-4D97-AF65-F5344CB8AC3E}">
-        <p14:creationId xmlns:p14="http://schemas.microsoft.com/office/powerpoint/2010/main" val="2070099628"/>
+        <p14:creationId xmlns:p14="http://schemas.microsoft.com/office/powerpoint/2010/main" val="355088366"/>
       </p:ext>
     </p:extLst>
   </p:cSld>
@@ -7537,7 +8850,7 @@
           <p:cNvPr id="2" name="Naslov 1">
             <a:extLst>
               <a:ext uri="{FF2B5EF4-FFF2-40B4-BE49-F238E27FC236}">
-                <a16:creationId xmlns:a16="http://schemas.microsoft.com/office/drawing/2014/main" id="{8185A772-B4AC-486C-BB4F-BAE2B4C3AB30}"/>
+                <a16:creationId xmlns:a16="http://schemas.microsoft.com/office/drawing/2014/main" id="{DF2D9F2C-C684-4CBE-A4F6-4A8EB6A292F8}"/>
               </a:ext>
             </a:extLst>
           </p:cNvPr>
@@ -7555,17 +8868,17 @@
           <a:p>
             <a:r>
               <a:rPr lang="sl-SI" dirty="0"/>
-              <a:t>Iskanje najpomembnejših besed (primer)</a:t>
-            </a:r>
-          </a:p>
-        </p:txBody>
-      </p:sp>
-      <p:sp>
-        <p:nvSpPr>
-          <p:cNvPr id="3" name="Označba mesta vsebine 2">
+              <a:t>Model C2</a:t>
+            </a:r>
+          </a:p>
+        </p:txBody>
+      </p:sp>
+      <p:sp>
+        <p:nvSpPr>
+          <p:cNvPr id="6" name="Označba mesta vsebine 5">
             <a:extLst>
               <a:ext uri="{FF2B5EF4-FFF2-40B4-BE49-F238E27FC236}">
-                <a16:creationId xmlns:a16="http://schemas.microsoft.com/office/drawing/2014/main" id="{12151333-E0AF-46C0-AB18-EE808EB84ACC}"/>
+                <a16:creationId xmlns:a16="http://schemas.microsoft.com/office/drawing/2014/main" id="{ADC7D29B-7270-4FD2-B795-6E592FC5AE3B}"/>
               </a:ext>
             </a:extLst>
           </p:cNvPr>
@@ -7581,194 +8894,136 @@
           <a:bodyPr/>
           <a:lstStyle/>
           <a:p>
-            <a:r>
-              <a:rPr lang="sl-SI" dirty="0"/>
-              <a:t>Q: </a:t>
-            </a:r>
-            <a:r>
-              <a:rPr lang="en-US" dirty="0"/>
-              <a:t>How does </a:t>
-            </a:r>
-            <a:r>
-              <a:rPr lang="en-US" dirty="0" err="1">
-                <a:solidFill>
-                  <a:srgbClr val="FF0000"/>
-                </a:solidFill>
-              </a:rPr>
-              <a:t>Shiranna</a:t>
-            </a:r>
-            <a:r>
-              <a:rPr lang="en-US" dirty="0"/>
-              <a:t> </a:t>
-            </a:r>
-            <a:r>
-              <a:rPr lang="en-US" dirty="0">
-                <a:solidFill>
-                  <a:schemeClr val="accent6">
-                    <a:lumMod val="75000"/>
-                  </a:schemeClr>
-                </a:solidFill>
-              </a:rPr>
-              <a:t>feel</a:t>
-            </a:r>
-            <a:r>
-              <a:rPr lang="en-US" dirty="0"/>
-              <a:t> </a:t>
-            </a:r>
-            <a:r>
-              <a:rPr lang="en-US" dirty="0">
-                <a:solidFill>
-                  <a:srgbClr val="00B0F0"/>
-                </a:solidFill>
-              </a:rPr>
-              <a:t>as the shuttle</a:t>
-            </a:r>
-            <a:r>
-              <a:rPr lang="en-US" dirty="0"/>
-              <a:t> </a:t>
-            </a:r>
-            <a:r>
-              <a:rPr lang="en-US" dirty="0">
-                <a:solidFill>
-                  <a:srgbClr val="FFC000"/>
-                </a:solidFill>
-              </a:rPr>
-              <a:t>is</a:t>
-            </a:r>
-            <a:r>
-              <a:rPr lang="en-US" dirty="0"/>
-              <a:t> </a:t>
-            </a:r>
-            <a:r>
-              <a:rPr lang="en-US" dirty="0">
-                <a:solidFill>
-                  <a:srgbClr val="00B0F0"/>
-                </a:solidFill>
-              </a:rPr>
-              <a:t>taking</a:t>
-            </a:r>
-            <a:r>
-              <a:rPr lang="en-US" dirty="0"/>
-              <a:t> </a:t>
-            </a:r>
-            <a:r>
-              <a:rPr lang="en-US" dirty="0">
-                <a:solidFill>
-                  <a:srgbClr val="00B0F0"/>
-                </a:solidFill>
-              </a:rPr>
-              <a:t>off</a:t>
-            </a:r>
-            <a:r>
-              <a:rPr lang="en-US" dirty="0"/>
-              <a:t>?</a:t>
-            </a:r>
-            <a:endParaRPr lang="sl-SI" dirty="0"/>
-          </a:p>
-          <a:p>
-            <a:endParaRPr lang="sl-SI" dirty="0"/>
-          </a:p>
-          <a:p>
-            <a:r>
-              <a:rPr lang="sl-SI" dirty="0"/>
-              <a:t>A1: </a:t>
-            </a:r>
-            <a:r>
-              <a:rPr lang="en-US" dirty="0"/>
-              <a:t>both </a:t>
-            </a:r>
-            <a:r>
-              <a:rPr lang="sl-SI" dirty="0" err="1"/>
-              <a:t>excite</a:t>
-            </a:r>
-            <a:r>
-              <a:rPr lang="en-US" dirty="0"/>
-              <a:t> and nervous</a:t>
-            </a:r>
-            <a:endParaRPr lang="sl-SI" dirty="0"/>
-          </a:p>
-          <a:p>
-            <a:r>
-              <a:rPr lang="sl-SI" dirty="0"/>
-              <a:t>A2: </a:t>
-            </a:r>
-            <a:r>
-              <a:rPr lang="sl-SI" dirty="0" err="1"/>
-              <a:t>nervous</a:t>
-            </a:r>
-            <a:r>
-              <a:rPr lang="en-US" dirty="0"/>
-              <a:t> but also </a:t>
-            </a:r>
-            <a:r>
-              <a:rPr lang="sl-SI" dirty="0" err="1"/>
-              <a:t>excite</a:t>
-            </a:r>
-            <a:r>
-              <a:rPr lang="en-US" dirty="0"/>
-              <a:t> to with her mother</a:t>
-            </a:r>
-            <a:endParaRPr lang="sl-SI" dirty="0"/>
-          </a:p>
-          <a:p>
-            <a:r>
-              <a:rPr lang="sl-SI" dirty="0"/>
-              <a:t>A3: </a:t>
-            </a:r>
-            <a:r>
-              <a:rPr lang="en-US" dirty="0"/>
-              <a:t>she excited and scared</a:t>
-            </a:r>
-            <a:endParaRPr lang="sl-SI" dirty="0"/>
-          </a:p>
-          <a:p>
-            <a:endParaRPr lang="sl-SI" dirty="0"/>
-          </a:p>
-          <a:p>
-            <a:endParaRPr lang="sl-SI" dirty="0"/>
-          </a:p>
-          <a:p>
-            <a:r>
-              <a:rPr lang="sl-SI" dirty="0"/>
-              <a:t>Dodatno odstranimo še besede kot so „</a:t>
-            </a:r>
-            <a:r>
-              <a:rPr lang="sl-SI" dirty="0" err="1"/>
-              <a:t>and</a:t>
-            </a:r>
-            <a:r>
-              <a:rPr lang="sl-SI" dirty="0"/>
-              <a:t>“, „</a:t>
-            </a:r>
-            <a:r>
-              <a:rPr lang="sl-SI" dirty="0" err="1"/>
-              <a:t>her</a:t>
-            </a:r>
-            <a:r>
-              <a:rPr lang="sl-SI" dirty="0"/>
-              <a:t>“, „</a:t>
-            </a:r>
-            <a:r>
-              <a:rPr lang="sl-SI" dirty="0" err="1"/>
-              <a:t>she</a:t>
-            </a:r>
-            <a:r>
-              <a:rPr lang="sl-SI" dirty="0"/>
-              <a:t>“, …</a:t>
-            </a:r>
-          </a:p>
-          <a:p>
-            <a:endParaRPr lang="sl-SI" dirty="0"/>
-          </a:p>
-          <a:p>
-            <a:endParaRPr lang="sl-SI" dirty="0"/>
+            <a:endParaRPr lang="sl-SI"/>
+          </a:p>
+        </p:txBody>
+      </p:sp>
+      <p:pic>
+        <p:nvPicPr>
+          <p:cNvPr id="7" name="Slika 6">
+            <a:extLst>
+              <a:ext uri="{FF2B5EF4-FFF2-40B4-BE49-F238E27FC236}">
+                <a16:creationId xmlns:a16="http://schemas.microsoft.com/office/drawing/2014/main" id="{AA584509-59B2-47FC-8456-317045B1A9EE}"/>
+              </a:ext>
+            </a:extLst>
+          </p:cNvPr>
+          <p:cNvPicPr>
+            <a:picLocks noChangeAspect="1"/>
+          </p:cNvPicPr>
+          <p:nvPr/>
+        </p:nvPicPr>
+        <p:blipFill>
+          <a:blip r:embed="rId2"/>
+          <a:stretch>
+            <a:fillRect/>
+          </a:stretch>
+        </p:blipFill>
+        <p:spPr>
+          <a:xfrm>
+            <a:off x="494522" y="1200734"/>
+            <a:ext cx="10977173" cy="5657266"/>
+          </a:xfrm>
+          <a:prstGeom prst="rect">
+            <a:avLst/>
+          </a:prstGeom>
+        </p:spPr>
+      </p:pic>
+      <p:sp>
+        <p:nvSpPr>
+          <p:cNvPr id="10" name="Diagram poteka: odločitev 9">
+            <a:extLst>
+              <a:ext uri="{FF2B5EF4-FFF2-40B4-BE49-F238E27FC236}">
+                <a16:creationId xmlns:a16="http://schemas.microsoft.com/office/drawing/2014/main" id="{DCDA5779-23CB-4DA0-AE4F-9ECCCD6FC2A5}"/>
+              </a:ext>
+            </a:extLst>
+          </p:cNvPr>
+          <p:cNvSpPr/>
+          <p:nvPr/>
+        </p:nvSpPr>
+        <p:spPr>
+          <a:xfrm>
+            <a:off x="7741327" y="5175682"/>
+            <a:ext cx="204187" cy="236637"/>
+          </a:xfrm>
+          <a:prstGeom prst="flowChartDecision">
+            <a:avLst/>
+          </a:prstGeom>
+        </p:spPr>
+        <p:style>
+          <a:lnRef idx="2">
+            <a:schemeClr val="accent1">
+              <a:shade val="50000"/>
+            </a:schemeClr>
+          </a:lnRef>
+          <a:fillRef idx="1">
+            <a:schemeClr val="accent1"/>
+          </a:fillRef>
+          <a:effectRef idx="0">
+            <a:schemeClr val="accent1"/>
+          </a:effectRef>
+          <a:fontRef idx="minor">
+            <a:schemeClr val="lt1"/>
+          </a:fontRef>
+        </p:style>
+        <p:txBody>
+          <a:bodyPr rtlCol="0" anchor="ctr"/>
+          <a:lstStyle/>
+          <a:p>
+            <a:pPr algn="ctr"/>
+            <a:endParaRPr lang="sl-SI"/>
+          </a:p>
+        </p:txBody>
+      </p:sp>
+      <p:sp>
+        <p:nvSpPr>
+          <p:cNvPr id="11" name="Diagram poteka: odločitev 10">
+            <a:extLst>
+              <a:ext uri="{FF2B5EF4-FFF2-40B4-BE49-F238E27FC236}">
+                <a16:creationId xmlns:a16="http://schemas.microsoft.com/office/drawing/2014/main" id="{A02D41F8-A89F-47DF-9293-7B683665228E}"/>
+              </a:ext>
+            </a:extLst>
+          </p:cNvPr>
+          <p:cNvSpPr/>
+          <p:nvPr/>
+        </p:nvSpPr>
+        <p:spPr>
+          <a:xfrm>
+            <a:off x="7741326" y="3596936"/>
+            <a:ext cx="204187" cy="236637"/>
+          </a:xfrm>
+          <a:prstGeom prst="flowChartDecision">
+            <a:avLst/>
+          </a:prstGeom>
+        </p:spPr>
+        <p:style>
+          <a:lnRef idx="2">
+            <a:schemeClr val="accent1">
+              <a:shade val="50000"/>
+            </a:schemeClr>
+          </a:lnRef>
+          <a:fillRef idx="1">
+            <a:schemeClr val="accent1"/>
+          </a:fillRef>
+          <a:effectRef idx="0">
+            <a:schemeClr val="accent1"/>
+          </a:effectRef>
+          <a:fontRef idx="minor">
+            <a:schemeClr val="lt1"/>
+          </a:fontRef>
+        </p:style>
+        <p:txBody>
+          <a:bodyPr rtlCol="0" anchor="ctr"/>
+          <a:lstStyle/>
+          <a:p>
+            <a:pPr algn="ctr"/>
+            <a:endParaRPr lang="sl-SI"/>
           </a:p>
         </p:txBody>
       </p:sp>
     </p:spTree>
     <p:extLst>
       <p:ext uri="{BB962C8B-B14F-4D97-AF65-F5344CB8AC3E}">
-        <p14:creationId xmlns:p14="http://schemas.microsoft.com/office/powerpoint/2010/main" val="1065468224"/>
+        <p14:creationId xmlns:p14="http://schemas.microsoft.com/office/powerpoint/2010/main" val="1816941472"/>
       </p:ext>
     </p:extLst>
   </p:cSld>
@@ -7800,7 +9055,7 @@
           <p:cNvPr id="2" name="Naslov 1">
             <a:extLst>
               <a:ext uri="{FF2B5EF4-FFF2-40B4-BE49-F238E27FC236}">
-                <a16:creationId xmlns:a16="http://schemas.microsoft.com/office/drawing/2014/main" id="{8185A772-B4AC-486C-BB4F-BAE2B4C3AB30}"/>
+                <a16:creationId xmlns:a16="http://schemas.microsoft.com/office/drawing/2014/main" id="{F8DBBB3F-16FA-4BA5-B97E-A4ED009FFAF9}"/>
               </a:ext>
             </a:extLst>
           </p:cNvPr>
@@ -7818,7 +9073,7 @@
           <a:p>
             <a:r>
               <a:rPr lang="sl-SI" dirty="0"/>
-              <a:t>Iskanje najpomembnejših besed (primer)</a:t>
+              <a:t>Model C3</a:t>
             </a:r>
           </a:p>
         </p:txBody>
@@ -7828,7 +9083,7 @@
           <p:cNvPr id="3" name="Označba mesta vsebine 2">
             <a:extLst>
               <a:ext uri="{FF2B5EF4-FFF2-40B4-BE49-F238E27FC236}">
-                <a16:creationId xmlns:a16="http://schemas.microsoft.com/office/drawing/2014/main" id="{12151333-E0AF-46C0-AB18-EE808EB84ACC}"/>
+                <a16:creationId xmlns:a16="http://schemas.microsoft.com/office/drawing/2014/main" id="{03E76952-6CD3-49EB-8276-0A5EE456F480}"/>
               </a:ext>
             </a:extLst>
           </p:cNvPr>
@@ -7844,81 +9099,90 @@
           <a:bodyPr/>
           <a:lstStyle/>
           <a:p>
-            <a:r>
-              <a:rPr lang="sl-SI" dirty="0"/>
-              <a:t>A1: </a:t>
-            </a:r>
-            <a:r>
-              <a:rPr lang="en-US" dirty="0"/>
-              <a:t>both </a:t>
-            </a:r>
-            <a:r>
-              <a:rPr lang="sl-SI" dirty="0" err="1"/>
-              <a:t>excite</a:t>
-            </a:r>
-            <a:r>
-              <a:rPr lang="en-US" dirty="0"/>
-              <a:t> nervous</a:t>
-            </a:r>
-            <a:endParaRPr lang="sl-SI" dirty="0"/>
-          </a:p>
-          <a:p>
-            <a:r>
-              <a:rPr lang="sl-SI" dirty="0"/>
-              <a:t>A2: </a:t>
-            </a:r>
-            <a:r>
-              <a:rPr lang="sl-SI" dirty="0" err="1"/>
-              <a:t>nervous</a:t>
-            </a:r>
-            <a:r>
-              <a:rPr lang="en-US" dirty="0"/>
-              <a:t> but also </a:t>
-            </a:r>
-            <a:r>
-              <a:rPr lang="sl-SI" dirty="0" err="1"/>
-              <a:t>excite</a:t>
-            </a:r>
-            <a:r>
-              <a:rPr lang="en-US" dirty="0"/>
-              <a:t> to with mother</a:t>
-            </a:r>
-            <a:endParaRPr lang="sl-SI" dirty="0"/>
-          </a:p>
-          <a:p>
-            <a:r>
-              <a:rPr lang="sl-SI" dirty="0"/>
-              <a:t>A3: </a:t>
-            </a:r>
-            <a:r>
-              <a:rPr lang="sl-SI" dirty="0" err="1"/>
-              <a:t>excite</a:t>
-            </a:r>
-            <a:r>
-              <a:rPr lang="en-US" dirty="0"/>
-              <a:t> </a:t>
-            </a:r>
-            <a:r>
-              <a:rPr lang="sl-SI" dirty="0" err="1"/>
-              <a:t>scare</a:t>
-            </a:r>
-            <a:endParaRPr lang="sl-SI" dirty="0"/>
-          </a:p>
-          <a:p>
-            <a:pPr marL="0" indent="0">
-              <a:buNone/>
-            </a:pPr>
-            <a:endParaRPr lang="sl-SI" dirty="0"/>
-          </a:p>
-          <a:p>
-            <a:endParaRPr lang="sl-SI" dirty="0"/>
+            <a:endParaRPr lang="sl-SI"/>
+          </a:p>
+        </p:txBody>
+      </p:sp>
+      <p:pic>
+        <p:nvPicPr>
+          <p:cNvPr id="4" name="Slika 3">
+            <a:extLst>
+              <a:ext uri="{FF2B5EF4-FFF2-40B4-BE49-F238E27FC236}">
+                <a16:creationId xmlns:a16="http://schemas.microsoft.com/office/drawing/2014/main" id="{B3555D04-66D5-4702-84B4-EA3CFB4E6B3C}"/>
+              </a:ext>
+            </a:extLst>
+          </p:cNvPr>
+          <p:cNvPicPr>
+            <a:picLocks noChangeAspect="1"/>
+          </p:cNvPicPr>
+          <p:nvPr/>
+        </p:nvPicPr>
+        <p:blipFill>
+          <a:blip r:embed="rId2"/>
+          <a:stretch>
+            <a:fillRect/>
+          </a:stretch>
+        </p:blipFill>
+        <p:spPr>
+          <a:xfrm>
+            <a:off x="-11078" y="1572768"/>
+            <a:ext cx="12203078" cy="5056414"/>
+          </a:xfrm>
+          <a:prstGeom prst="rect">
+            <a:avLst/>
+          </a:prstGeom>
+        </p:spPr>
+      </p:pic>
+      <p:sp>
+        <p:nvSpPr>
+          <p:cNvPr id="5" name="Diagram poteka: odločitev 4">
+            <a:extLst>
+              <a:ext uri="{FF2B5EF4-FFF2-40B4-BE49-F238E27FC236}">
+                <a16:creationId xmlns:a16="http://schemas.microsoft.com/office/drawing/2014/main" id="{1A2072DB-4D50-413D-ADFD-9E3E9F6E8BEC}"/>
+              </a:ext>
+            </a:extLst>
+          </p:cNvPr>
+          <p:cNvSpPr/>
+          <p:nvPr/>
+        </p:nvSpPr>
+        <p:spPr>
+          <a:xfrm>
+            <a:off x="7965262" y="2912231"/>
+            <a:ext cx="264756" cy="306832"/>
+          </a:xfrm>
+          <a:prstGeom prst="flowChartDecision">
+            <a:avLst/>
+          </a:prstGeom>
+        </p:spPr>
+        <p:style>
+          <a:lnRef idx="2">
+            <a:schemeClr val="accent1">
+              <a:shade val="50000"/>
+            </a:schemeClr>
+          </a:lnRef>
+          <a:fillRef idx="1">
+            <a:schemeClr val="accent1"/>
+          </a:fillRef>
+          <a:effectRef idx="0">
+            <a:schemeClr val="accent1"/>
+          </a:effectRef>
+          <a:fontRef idx="minor">
+            <a:schemeClr val="lt1"/>
+          </a:fontRef>
+        </p:style>
+        <p:txBody>
+          <a:bodyPr rtlCol="0" anchor="ctr"/>
+          <a:lstStyle/>
+          <a:p>
+            <a:pPr algn="ctr"/>
+            <a:endParaRPr lang="sl-SI"/>
           </a:p>
         </p:txBody>
       </p:sp>
     </p:spTree>
     <p:extLst>
       <p:ext uri="{BB962C8B-B14F-4D97-AF65-F5344CB8AC3E}">
-        <p14:creationId xmlns:p14="http://schemas.microsoft.com/office/powerpoint/2010/main" val="704828784"/>
+        <p14:creationId xmlns:p14="http://schemas.microsoft.com/office/powerpoint/2010/main" val="519487607"/>
       </p:ext>
     </p:extLst>
   </p:cSld>
@@ -8183,4 +9447,299 @@
     </a:ext>
   </a:extLst>
 </a:theme>
+</file>
+
+<file path=ppt/theme/theme2.xml><?xml version="1.0" encoding="utf-8"?>
+<a:theme xmlns:a="http://schemas.openxmlformats.org/drawingml/2006/main" name="Officeova tema">
+  <a:themeElements>
+    <a:clrScheme name="Pisarna">
+      <a:dk1>
+        <a:sysClr val="windowText" lastClr="000000"/>
+      </a:dk1>
+      <a:lt1>
+        <a:sysClr val="window" lastClr="FFFFFF"/>
+      </a:lt1>
+      <a:dk2>
+        <a:srgbClr val="44546A"/>
+      </a:dk2>
+      <a:lt2>
+        <a:srgbClr val="E7E6E6"/>
+      </a:lt2>
+      <a:accent1>
+        <a:srgbClr val="4472C4"/>
+      </a:accent1>
+      <a:accent2>
+        <a:srgbClr val="ED7D31"/>
+      </a:accent2>
+      <a:accent3>
+        <a:srgbClr val="A5A5A5"/>
+      </a:accent3>
+      <a:accent4>
+        <a:srgbClr val="FFC000"/>
+      </a:accent4>
+      <a:accent5>
+        <a:srgbClr val="5B9BD5"/>
+      </a:accent5>
+      <a:accent6>
+        <a:srgbClr val="70AD47"/>
+      </a:accent6>
+      <a:hlink>
+        <a:srgbClr val="0563C1"/>
+      </a:hlink>
+      <a:folHlink>
+        <a:srgbClr val="954F72"/>
+      </a:folHlink>
+    </a:clrScheme>
+    <a:fontScheme name="Pisarna">
+      <a:majorFont>
+        <a:latin typeface="Calibri Light" panose="020F0302020204030204"/>
+        <a:ea typeface=""/>
+        <a:cs typeface=""/>
+        <a:font script="Jpan" typeface="游ゴシック Light"/>
+        <a:font script="Hang" typeface="맑은 고딕"/>
+        <a:font script="Hans" typeface="等线 Light"/>
+        <a:font script="Hant" typeface="新細明體"/>
+        <a:font script="Arab" typeface="Times New Roman"/>
+        <a:font script="Hebr" typeface="Times New Roman"/>
+        <a:font script="Thai" typeface="Angsana New"/>
+        <a:font script="Ethi" typeface="Nyala"/>
+        <a:font script="Beng" typeface="Vrinda"/>
+        <a:font script="Gujr" typeface="Shruti"/>
+        <a:font script="Khmr" typeface="MoolBoran"/>
+        <a:font script="Knda" typeface="Tunga"/>
+        <a:font script="Guru" typeface="Raavi"/>
+        <a:font script="Cans" typeface="Euphemia"/>
+        <a:font script="Cher" typeface="Plantagenet Cherokee"/>
+        <a:font script="Yiii" typeface="Microsoft Yi Baiti"/>
+        <a:font script="Tibt" typeface="Microsoft Himalaya"/>
+        <a:font script="Thaa" typeface="MV Boli"/>
+        <a:font script="Deva" typeface="Mangal"/>
+        <a:font script="Telu" typeface="Gautami"/>
+        <a:font script="Taml" typeface="Latha"/>
+        <a:font script="Syrc" typeface="Estrangelo Edessa"/>
+        <a:font script="Orya" typeface="Kalinga"/>
+        <a:font script="Mlym" typeface="Kartika"/>
+        <a:font script="Laoo" typeface="DokChampa"/>
+        <a:font script="Sinh" typeface="Iskoola Pota"/>
+        <a:font script="Mong" typeface="Mongolian Baiti"/>
+        <a:font script="Viet" typeface="Times New Roman"/>
+        <a:font script="Uigh" typeface="Microsoft Uighur"/>
+        <a:font script="Geor" typeface="Sylfaen"/>
+        <a:font script="Armn" typeface="Arial"/>
+        <a:font script="Bugi" typeface="Leelawadee UI"/>
+        <a:font script="Bopo" typeface="Microsoft JhengHei"/>
+        <a:font script="Java" typeface="Javanese Text"/>
+        <a:font script="Lisu" typeface="Segoe UI"/>
+        <a:font script="Mymr" typeface="Myanmar Text"/>
+        <a:font script="Nkoo" typeface="Ebrima"/>
+        <a:font script="Olck" typeface="Nirmala UI"/>
+        <a:font script="Osma" typeface="Ebrima"/>
+        <a:font script="Phag" typeface="Phagspa"/>
+        <a:font script="Syrn" typeface="Estrangelo Edessa"/>
+        <a:font script="Syrj" typeface="Estrangelo Edessa"/>
+        <a:font script="Syre" typeface="Estrangelo Edessa"/>
+        <a:font script="Sora" typeface="Nirmala UI"/>
+        <a:font script="Tale" typeface="Microsoft Tai Le"/>
+        <a:font script="Talu" typeface="Microsoft New Tai Lue"/>
+        <a:font script="Tfng" typeface="Ebrima"/>
+      </a:majorFont>
+      <a:minorFont>
+        <a:latin typeface="Calibri" panose="020F0502020204030204"/>
+        <a:ea typeface=""/>
+        <a:cs typeface=""/>
+        <a:font script="Jpan" typeface="游ゴシック"/>
+        <a:font script="Hang" typeface="맑은 고딕"/>
+        <a:font script="Hans" typeface="等线"/>
+        <a:font script="Hant" typeface="新細明體"/>
+        <a:font script="Arab" typeface="Arial"/>
+        <a:font script="Hebr" typeface="Arial"/>
+        <a:font script="Thai" typeface="Cordia New"/>
+        <a:font script="Ethi" typeface="Nyala"/>
+        <a:font script="Beng" typeface="Vrinda"/>
+        <a:font script="Gujr" typeface="Shruti"/>
+        <a:font script="Khmr" typeface="DaunPenh"/>
+        <a:font script="Knda" typeface="Tunga"/>
+        <a:font script="Guru" typeface="Raavi"/>
+        <a:font script="Cans" typeface="Euphemia"/>
+        <a:font script="Cher" typeface="Plantagenet Cherokee"/>
+        <a:font script="Yiii" typeface="Microsoft Yi Baiti"/>
+        <a:font script="Tibt" typeface="Microsoft Himalaya"/>
+        <a:font script="Thaa" typeface="MV Boli"/>
+        <a:font script="Deva" typeface="Mangal"/>
+        <a:font script="Telu" typeface="Gautami"/>
+        <a:font script="Taml" typeface="Latha"/>
+        <a:font script="Syrc" typeface="Estrangelo Edessa"/>
+        <a:font script="Orya" typeface="Kalinga"/>
+        <a:font script="Mlym" typeface="Kartika"/>
+        <a:font script="Laoo" typeface="DokChampa"/>
+        <a:font script="Sinh" typeface="Iskoola Pota"/>
+        <a:font script="Mong" typeface="Mongolian Baiti"/>
+        <a:font script="Viet" typeface="Arial"/>
+        <a:font script="Uigh" typeface="Microsoft Uighur"/>
+        <a:font script="Geor" typeface="Sylfaen"/>
+        <a:font script="Armn" typeface="Arial"/>
+        <a:font script="Bugi" typeface="Leelawadee UI"/>
+        <a:font script="Bopo" typeface="Microsoft JhengHei"/>
+        <a:font script="Java" typeface="Javanese Text"/>
+        <a:font script="Lisu" typeface="Segoe UI"/>
+        <a:font script="Mymr" typeface="Myanmar Text"/>
+        <a:font script="Nkoo" typeface="Ebrima"/>
+        <a:font script="Olck" typeface="Nirmala UI"/>
+        <a:font script="Osma" typeface="Ebrima"/>
+        <a:font script="Phag" typeface="Phagspa"/>
+        <a:font script="Syrn" typeface="Estrangelo Edessa"/>
+        <a:font script="Syrj" typeface="Estrangelo Edessa"/>
+        <a:font script="Syre" typeface="Estrangelo Edessa"/>
+        <a:font script="Sora" typeface="Nirmala UI"/>
+        <a:font script="Tale" typeface="Microsoft Tai Le"/>
+        <a:font script="Talu" typeface="Microsoft New Tai Lue"/>
+        <a:font script="Tfng" typeface="Ebrima"/>
+      </a:minorFont>
+    </a:fontScheme>
+    <a:fmtScheme name="Pisarna">
+      <a:fillStyleLst>
+        <a:solidFill>
+          <a:schemeClr val="phClr"/>
+        </a:solidFill>
+        <a:gradFill rotWithShape="1">
+          <a:gsLst>
+            <a:gs pos="0">
+              <a:schemeClr val="phClr">
+                <a:lumMod val="110000"/>
+                <a:satMod val="105000"/>
+                <a:tint val="67000"/>
+              </a:schemeClr>
+            </a:gs>
+            <a:gs pos="50000">
+              <a:schemeClr val="phClr">
+                <a:lumMod val="105000"/>
+                <a:satMod val="103000"/>
+                <a:tint val="73000"/>
+              </a:schemeClr>
+            </a:gs>
+            <a:gs pos="100000">
+              <a:schemeClr val="phClr">
+                <a:lumMod val="105000"/>
+                <a:satMod val="109000"/>
+                <a:tint val="81000"/>
+              </a:schemeClr>
+            </a:gs>
+          </a:gsLst>
+          <a:lin ang="5400000" scaled="0"/>
+        </a:gradFill>
+        <a:gradFill rotWithShape="1">
+          <a:gsLst>
+            <a:gs pos="0">
+              <a:schemeClr val="phClr">
+                <a:satMod val="103000"/>
+                <a:lumMod val="102000"/>
+                <a:tint val="94000"/>
+              </a:schemeClr>
+            </a:gs>
+            <a:gs pos="50000">
+              <a:schemeClr val="phClr">
+                <a:satMod val="110000"/>
+                <a:lumMod val="100000"/>
+                <a:shade val="100000"/>
+              </a:schemeClr>
+            </a:gs>
+            <a:gs pos="100000">
+              <a:schemeClr val="phClr">
+                <a:lumMod val="99000"/>
+                <a:satMod val="120000"/>
+                <a:shade val="78000"/>
+              </a:schemeClr>
+            </a:gs>
+          </a:gsLst>
+          <a:lin ang="5400000" scaled="0"/>
+        </a:gradFill>
+      </a:fillStyleLst>
+      <a:lnStyleLst>
+        <a:ln w="6350" cap="flat" cmpd="sng" algn="ctr">
+          <a:solidFill>
+            <a:schemeClr val="phClr"/>
+          </a:solidFill>
+          <a:prstDash val="solid"/>
+          <a:miter lim="800000"/>
+        </a:ln>
+        <a:ln w="12700" cap="flat" cmpd="sng" algn="ctr">
+          <a:solidFill>
+            <a:schemeClr val="phClr"/>
+          </a:solidFill>
+          <a:prstDash val="solid"/>
+          <a:miter lim="800000"/>
+        </a:ln>
+        <a:ln w="19050" cap="flat" cmpd="sng" algn="ctr">
+          <a:solidFill>
+            <a:schemeClr val="phClr"/>
+          </a:solidFill>
+          <a:prstDash val="solid"/>
+          <a:miter lim="800000"/>
+        </a:ln>
+      </a:lnStyleLst>
+      <a:effectStyleLst>
+        <a:effectStyle>
+          <a:effectLst/>
+        </a:effectStyle>
+        <a:effectStyle>
+          <a:effectLst/>
+        </a:effectStyle>
+        <a:effectStyle>
+          <a:effectLst>
+            <a:outerShdw blurRad="57150" dist="19050" dir="5400000" algn="ctr" rotWithShape="0">
+              <a:srgbClr val="000000">
+                <a:alpha val="63000"/>
+              </a:srgbClr>
+            </a:outerShdw>
+          </a:effectLst>
+        </a:effectStyle>
+      </a:effectStyleLst>
+      <a:bgFillStyleLst>
+        <a:solidFill>
+          <a:schemeClr val="phClr"/>
+        </a:solidFill>
+        <a:solidFill>
+          <a:schemeClr val="phClr">
+            <a:tint val="95000"/>
+            <a:satMod val="170000"/>
+          </a:schemeClr>
+        </a:solidFill>
+        <a:gradFill rotWithShape="1">
+          <a:gsLst>
+            <a:gs pos="0">
+              <a:schemeClr val="phClr">
+                <a:tint val="93000"/>
+                <a:satMod val="150000"/>
+                <a:shade val="98000"/>
+                <a:lumMod val="102000"/>
+              </a:schemeClr>
+            </a:gs>
+            <a:gs pos="50000">
+              <a:schemeClr val="phClr">
+                <a:tint val="98000"/>
+                <a:satMod val="130000"/>
+                <a:shade val="90000"/>
+                <a:lumMod val="103000"/>
+              </a:schemeClr>
+            </a:gs>
+            <a:gs pos="100000">
+              <a:schemeClr val="phClr">
+                <a:shade val="63000"/>
+                <a:satMod val="120000"/>
+              </a:schemeClr>
+            </a:gs>
+          </a:gsLst>
+          <a:lin ang="5400000" scaled="0"/>
+        </a:gradFill>
+      </a:bgFillStyleLst>
+    </a:fmtScheme>
+  </a:themeElements>
+  <a:objectDefaults/>
+  <a:extraClrSchemeLst/>
+  <a:extLst>
+    <a:ext uri="{05A4C25C-085E-4340-85A3-A5531E510DB2}">
+      <thm15:themeFamily xmlns:thm15="http://schemas.microsoft.com/office/thememl/2012/main" name="Office Theme" id="{62F939B6-93AF-4DB8-9C6B-D6C7DFDC589F}" vid="{4A3C46E8-61CC-4603-A589-7422A47A8E4A}"/>
+    </a:ext>
+  </a:extLst>
+</a:theme>
 </file>
</xml_diff>

<commit_message>
Majhen popravek prezentacije ter nalaganje končnega poročila ter predstavitve.
</commit_message>
<xml_diff>
--- a/presentation.pptx
+++ b/presentation.pptx
@@ -7924,15 +7924,25 @@
             </a:r>
             <a:r>
               <a:rPr lang="sl-SI" dirty="0"/>
-              <a:t>: 65%</a:t>
-            </a:r>
+              <a:t>: </a:t>
+            </a:r>
+            <a:r>
+              <a:rPr lang="sl-SI" dirty="0" smtClean="0"/>
+              <a:t>72%</a:t>
+            </a:r>
+            <a:endParaRPr lang="sl-SI" dirty="0"/>
           </a:p>
           <a:p>
             <a:pPr lvl="1"/>
             <a:r>
               <a:rPr lang="sl-SI" dirty="0"/>
-              <a:t>Makro: 48%</a:t>
-            </a:r>
+              <a:t>Makro: </a:t>
+            </a:r>
+            <a:r>
+              <a:rPr lang="sl-SI" dirty="0" smtClean="0"/>
+              <a:t>49%</a:t>
+            </a:r>
+            <a:endParaRPr lang="sl-SI" dirty="0"/>
           </a:p>
           <a:p>
             <a:r>
@@ -7948,15 +7958,25 @@
             </a:r>
             <a:r>
               <a:rPr lang="sl-SI" dirty="0"/>
-              <a:t>: 72%</a:t>
-            </a:r>
+              <a:t>: </a:t>
+            </a:r>
+            <a:r>
+              <a:rPr lang="sl-SI" dirty="0" smtClean="0"/>
+              <a:t>65%</a:t>
+            </a:r>
+            <a:endParaRPr lang="sl-SI" dirty="0"/>
           </a:p>
           <a:p>
             <a:pPr lvl="1"/>
             <a:r>
               <a:rPr lang="sl-SI" dirty="0"/>
-              <a:t>Makro: 49%</a:t>
-            </a:r>
+              <a:t>Makro: </a:t>
+            </a:r>
+            <a:r>
+              <a:rPr lang="sl-SI" dirty="0" smtClean="0"/>
+              <a:t>48%</a:t>
+            </a:r>
+            <a:endParaRPr lang="sl-SI" dirty="0"/>
           </a:p>
           <a:p>
             <a:r>

</xml_diff>